<commit_message>
Changed order of slides and generated new tables
</commit_message>
<xml_diff>
--- a/COMP220/04/diagrams.pptx
+++ b/COMP220/04/diagrams.pptx
@@ -7,6 +7,9 @@
   <p:sldIdLst>
     <p:sldId id="256" r:id="rId2"/>
     <p:sldId id="257" r:id="rId3"/>
+    <p:sldId id="258" r:id="rId4"/>
+    <p:sldId id="259" r:id="rId5"/>
+    <p:sldId id="260" r:id="rId6"/>
   </p:sldIdLst>
   <p:sldSz cx="12192000" cy="6858000"/>
   <p:notesSz cx="6858000" cy="9144000"/>
@@ -105,6 +108,11 @@
       </a:defRPr>
     </a:lvl9pPr>
   </p:defaultTextStyle>
+  <p:extLst>
+    <p:ext uri="{EFAFB233-063F-42B5-8137-9DF3F51BA10A}">
+      <p15:sldGuideLst xmlns:p15="http://schemas.microsoft.com/office/powerpoint/2012/main"/>
+    </p:ext>
+  </p:extLst>
 </p:presentation>
 </file>
 
@@ -150,7 +158,7 @@
           </a:lstStyle>
           <a:p>
             <a:r>
-              <a:rPr lang="en-US" smtClean="0"/>
+              <a:rPr lang="en-US"/>
               <a:t>Click to edit Master title style</a:t>
             </a:r>
             <a:endParaRPr lang="en-GB"/>
@@ -215,7 +223,7 @@
           </a:lstStyle>
           <a:p>
             <a:r>
-              <a:rPr lang="en-US" smtClean="0"/>
+              <a:rPr lang="en-US"/>
               <a:t>Click to edit Master subtitle style</a:t>
             </a:r>
             <a:endParaRPr lang="en-GB"/>
@@ -239,7 +247,7 @@
           <a:p>
             <a:fld id="{69793EBB-23D2-486D-A26A-0711F09D4BD5}" type="datetimeFigureOut">
               <a:rPr lang="en-GB" smtClean="0"/>
-              <a:t>12/10/2016</a:t>
+              <a:t>14/10/2018</a:t>
             </a:fld>
             <a:endParaRPr lang="en-GB"/>
           </a:p>
@@ -333,7 +341,7 @@
           <a:lstStyle/>
           <a:p>
             <a:r>
-              <a:rPr lang="en-US" smtClean="0"/>
+              <a:rPr lang="en-US"/>
               <a:t>Click to edit Master title style</a:t>
             </a:r>
             <a:endParaRPr lang="en-GB"/>
@@ -357,35 +365,35 @@
           <a:p>
             <a:pPr lvl="0"/>
             <a:r>
-              <a:rPr lang="en-US" smtClean="0"/>
+              <a:rPr lang="en-US"/>
               <a:t>Click to edit Master text styles</a:t>
             </a:r>
           </a:p>
           <a:p>
             <a:pPr lvl="1"/>
             <a:r>
-              <a:rPr lang="en-US" smtClean="0"/>
+              <a:rPr lang="en-US"/>
               <a:t>Second level</a:t>
             </a:r>
           </a:p>
           <a:p>
             <a:pPr lvl="2"/>
             <a:r>
-              <a:rPr lang="en-US" smtClean="0"/>
+              <a:rPr lang="en-US"/>
               <a:t>Third level</a:t>
             </a:r>
           </a:p>
           <a:p>
             <a:pPr lvl="3"/>
             <a:r>
-              <a:rPr lang="en-US" smtClean="0"/>
+              <a:rPr lang="en-US"/>
               <a:t>Fourth level</a:t>
             </a:r>
           </a:p>
           <a:p>
             <a:pPr lvl="4"/>
             <a:r>
-              <a:rPr lang="en-US" smtClean="0"/>
+              <a:rPr lang="en-US"/>
               <a:t>Fifth level</a:t>
             </a:r>
             <a:endParaRPr lang="en-GB"/>
@@ -409,7 +417,7 @@
           <a:p>
             <a:fld id="{69793EBB-23D2-486D-A26A-0711F09D4BD5}" type="datetimeFigureOut">
               <a:rPr lang="en-GB" smtClean="0"/>
-              <a:t>12/10/2016</a:t>
+              <a:t>14/10/2018</a:t>
             </a:fld>
             <a:endParaRPr lang="en-GB"/>
           </a:p>
@@ -508,7 +516,7 @@
           <a:lstStyle/>
           <a:p>
             <a:r>
-              <a:rPr lang="en-US" smtClean="0"/>
+              <a:rPr lang="en-US"/>
               <a:t>Click to edit Master title style</a:t>
             </a:r>
             <a:endParaRPr lang="en-GB"/>
@@ -537,35 +545,35 @@
           <a:p>
             <a:pPr lvl="0"/>
             <a:r>
-              <a:rPr lang="en-US" smtClean="0"/>
+              <a:rPr lang="en-US"/>
               <a:t>Click to edit Master text styles</a:t>
             </a:r>
           </a:p>
           <a:p>
             <a:pPr lvl="1"/>
             <a:r>
-              <a:rPr lang="en-US" smtClean="0"/>
+              <a:rPr lang="en-US"/>
               <a:t>Second level</a:t>
             </a:r>
           </a:p>
           <a:p>
             <a:pPr lvl="2"/>
             <a:r>
-              <a:rPr lang="en-US" smtClean="0"/>
+              <a:rPr lang="en-US"/>
               <a:t>Third level</a:t>
             </a:r>
           </a:p>
           <a:p>
             <a:pPr lvl="3"/>
             <a:r>
-              <a:rPr lang="en-US" smtClean="0"/>
+              <a:rPr lang="en-US"/>
               <a:t>Fourth level</a:t>
             </a:r>
           </a:p>
           <a:p>
             <a:pPr lvl="4"/>
             <a:r>
-              <a:rPr lang="en-US" smtClean="0"/>
+              <a:rPr lang="en-US"/>
               <a:t>Fifth level</a:t>
             </a:r>
             <a:endParaRPr lang="en-GB"/>
@@ -589,7 +597,7 @@
           <a:p>
             <a:fld id="{69793EBB-23D2-486D-A26A-0711F09D4BD5}" type="datetimeFigureOut">
               <a:rPr lang="en-GB" smtClean="0"/>
-              <a:t>12/10/2016</a:t>
+              <a:t>14/10/2018</a:t>
             </a:fld>
             <a:endParaRPr lang="en-GB"/>
           </a:p>
@@ -683,7 +691,7 @@
           <a:lstStyle/>
           <a:p>
             <a:r>
-              <a:rPr lang="en-US" smtClean="0"/>
+              <a:rPr lang="en-US"/>
               <a:t>Click to edit Master title style</a:t>
             </a:r>
             <a:endParaRPr lang="en-GB"/>
@@ -707,35 +715,35 @@
           <a:p>
             <a:pPr lvl="0"/>
             <a:r>
-              <a:rPr lang="en-US" smtClean="0"/>
+              <a:rPr lang="en-US"/>
               <a:t>Click to edit Master text styles</a:t>
             </a:r>
           </a:p>
           <a:p>
             <a:pPr lvl="1"/>
             <a:r>
-              <a:rPr lang="en-US" smtClean="0"/>
+              <a:rPr lang="en-US"/>
               <a:t>Second level</a:t>
             </a:r>
           </a:p>
           <a:p>
             <a:pPr lvl="2"/>
             <a:r>
-              <a:rPr lang="en-US" smtClean="0"/>
+              <a:rPr lang="en-US"/>
               <a:t>Third level</a:t>
             </a:r>
           </a:p>
           <a:p>
             <a:pPr lvl="3"/>
             <a:r>
-              <a:rPr lang="en-US" smtClean="0"/>
+              <a:rPr lang="en-US"/>
               <a:t>Fourth level</a:t>
             </a:r>
           </a:p>
           <a:p>
             <a:pPr lvl="4"/>
             <a:r>
-              <a:rPr lang="en-US" smtClean="0"/>
+              <a:rPr lang="en-US"/>
               <a:t>Fifth level</a:t>
             </a:r>
             <a:endParaRPr lang="en-GB"/>
@@ -759,7 +767,7 @@
           <a:p>
             <a:fld id="{69793EBB-23D2-486D-A26A-0711F09D4BD5}" type="datetimeFigureOut">
               <a:rPr lang="en-GB" smtClean="0"/>
-              <a:t>12/10/2016</a:t>
+              <a:t>14/10/2018</a:t>
             </a:fld>
             <a:endParaRPr lang="en-GB"/>
           </a:p>
@@ -862,7 +870,7 @@
           </a:lstStyle>
           <a:p>
             <a:r>
-              <a:rPr lang="en-US" smtClean="0"/>
+              <a:rPr lang="en-US"/>
               <a:t>Click to edit Master title style</a:t>
             </a:r>
             <a:endParaRPr lang="en-GB"/>
@@ -982,7 +990,7 @@
           <a:p>
             <a:pPr lvl="0"/>
             <a:r>
-              <a:rPr lang="en-US" smtClean="0"/>
+              <a:rPr lang="en-US"/>
               <a:t>Click to edit Master text styles</a:t>
             </a:r>
           </a:p>
@@ -1005,7 +1013,7 @@
           <a:p>
             <a:fld id="{69793EBB-23D2-486D-A26A-0711F09D4BD5}" type="datetimeFigureOut">
               <a:rPr lang="en-GB" smtClean="0"/>
-              <a:t>12/10/2016</a:t>
+              <a:t>14/10/2018</a:t>
             </a:fld>
             <a:endParaRPr lang="en-GB"/>
           </a:p>
@@ -1099,7 +1107,7 @@
           <a:lstStyle/>
           <a:p>
             <a:r>
-              <a:rPr lang="en-US" smtClean="0"/>
+              <a:rPr lang="en-US"/>
               <a:t>Click to edit Master title style</a:t>
             </a:r>
             <a:endParaRPr lang="en-GB"/>
@@ -1128,35 +1136,35 @@
           <a:p>
             <a:pPr lvl="0"/>
             <a:r>
-              <a:rPr lang="en-US" smtClean="0"/>
+              <a:rPr lang="en-US"/>
               <a:t>Click to edit Master text styles</a:t>
             </a:r>
           </a:p>
           <a:p>
             <a:pPr lvl="1"/>
             <a:r>
-              <a:rPr lang="en-US" smtClean="0"/>
+              <a:rPr lang="en-US"/>
               <a:t>Second level</a:t>
             </a:r>
           </a:p>
           <a:p>
             <a:pPr lvl="2"/>
             <a:r>
-              <a:rPr lang="en-US" smtClean="0"/>
+              <a:rPr lang="en-US"/>
               <a:t>Third level</a:t>
             </a:r>
           </a:p>
           <a:p>
             <a:pPr lvl="3"/>
             <a:r>
-              <a:rPr lang="en-US" smtClean="0"/>
+              <a:rPr lang="en-US"/>
               <a:t>Fourth level</a:t>
             </a:r>
           </a:p>
           <a:p>
             <a:pPr lvl="4"/>
             <a:r>
-              <a:rPr lang="en-US" smtClean="0"/>
+              <a:rPr lang="en-US"/>
               <a:t>Fifth level</a:t>
             </a:r>
             <a:endParaRPr lang="en-GB"/>
@@ -1185,35 +1193,35 @@
           <a:p>
             <a:pPr lvl="0"/>
             <a:r>
-              <a:rPr lang="en-US" smtClean="0"/>
+              <a:rPr lang="en-US"/>
               <a:t>Click to edit Master text styles</a:t>
             </a:r>
           </a:p>
           <a:p>
             <a:pPr lvl="1"/>
             <a:r>
-              <a:rPr lang="en-US" smtClean="0"/>
+              <a:rPr lang="en-US"/>
               <a:t>Second level</a:t>
             </a:r>
           </a:p>
           <a:p>
             <a:pPr lvl="2"/>
             <a:r>
-              <a:rPr lang="en-US" smtClean="0"/>
+              <a:rPr lang="en-US"/>
               <a:t>Third level</a:t>
             </a:r>
           </a:p>
           <a:p>
             <a:pPr lvl="3"/>
             <a:r>
-              <a:rPr lang="en-US" smtClean="0"/>
+              <a:rPr lang="en-US"/>
               <a:t>Fourth level</a:t>
             </a:r>
           </a:p>
           <a:p>
             <a:pPr lvl="4"/>
             <a:r>
-              <a:rPr lang="en-US" smtClean="0"/>
+              <a:rPr lang="en-US"/>
               <a:t>Fifth level</a:t>
             </a:r>
             <a:endParaRPr lang="en-GB"/>
@@ -1237,7 +1245,7 @@
           <a:p>
             <a:fld id="{69793EBB-23D2-486D-A26A-0711F09D4BD5}" type="datetimeFigureOut">
               <a:rPr lang="en-GB" smtClean="0"/>
-              <a:t>12/10/2016</a:t>
+              <a:t>14/10/2018</a:t>
             </a:fld>
             <a:endParaRPr lang="en-GB"/>
           </a:p>
@@ -1336,7 +1344,7 @@
           <a:lstStyle/>
           <a:p>
             <a:r>
-              <a:rPr lang="en-US" smtClean="0"/>
+              <a:rPr lang="en-US"/>
               <a:t>Click to edit Master title style</a:t>
             </a:r>
             <a:endParaRPr lang="en-GB"/>
@@ -1402,7 +1410,7 @@
           <a:p>
             <a:pPr lvl="0"/>
             <a:r>
-              <a:rPr lang="en-US" smtClean="0"/>
+              <a:rPr lang="en-US"/>
               <a:t>Click to edit Master text styles</a:t>
             </a:r>
           </a:p>
@@ -1430,35 +1438,35 @@
           <a:p>
             <a:pPr lvl="0"/>
             <a:r>
-              <a:rPr lang="en-US" smtClean="0"/>
+              <a:rPr lang="en-US"/>
               <a:t>Click to edit Master text styles</a:t>
             </a:r>
           </a:p>
           <a:p>
             <a:pPr lvl="1"/>
             <a:r>
-              <a:rPr lang="en-US" smtClean="0"/>
+              <a:rPr lang="en-US"/>
               <a:t>Second level</a:t>
             </a:r>
           </a:p>
           <a:p>
             <a:pPr lvl="2"/>
             <a:r>
-              <a:rPr lang="en-US" smtClean="0"/>
+              <a:rPr lang="en-US"/>
               <a:t>Third level</a:t>
             </a:r>
           </a:p>
           <a:p>
             <a:pPr lvl="3"/>
             <a:r>
-              <a:rPr lang="en-US" smtClean="0"/>
+              <a:rPr lang="en-US"/>
               <a:t>Fourth level</a:t>
             </a:r>
           </a:p>
           <a:p>
             <a:pPr lvl="4"/>
             <a:r>
-              <a:rPr lang="en-US" smtClean="0"/>
+              <a:rPr lang="en-US"/>
               <a:t>Fifth level</a:t>
             </a:r>
             <a:endParaRPr lang="en-GB"/>
@@ -1524,7 +1532,7 @@
           <a:p>
             <a:pPr lvl="0"/>
             <a:r>
-              <a:rPr lang="en-US" smtClean="0"/>
+              <a:rPr lang="en-US"/>
               <a:t>Click to edit Master text styles</a:t>
             </a:r>
           </a:p>
@@ -1552,35 +1560,35 @@
           <a:p>
             <a:pPr lvl="0"/>
             <a:r>
-              <a:rPr lang="en-US" smtClean="0"/>
+              <a:rPr lang="en-US"/>
               <a:t>Click to edit Master text styles</a:t>
             </a:r>
           </a:p>
           <a:p>
             <a:pPr lvl="1"/>
             <a:r>
-              <a:rPr lang="en-US" smtClean="0"/>
+              <a:rPr lang="en-US"/>
               <a:t>Second level</a:t>
             </a:r>
           </a:p>
           <a:p>
             <a:pPr lvl="2"/>
             <a:r>
-              <a:rPr lang="en-US" smtClean="0"/>
+              <a:rPr lang="en-US"/>
               <a:t>Third level</a:t>
             </a:r>
           </a:p>
           <a:p>
             <a:pPr lvl="3"/>
             <a:r>
-              <a:rPr lang="en-US" smtClean="0"/>
+              <a:rPr lang="en-US"/>
               <a:t>Fourth level</a:t>
             </a:r>
           </a:p>
           <a:p>
             <a:pPr lvl="4"/>
             <a:r>
-              <a:rPr lang="en-US" smtClean="0"/>
+              <a:rPr lang="en-US"/>
               <a:t>Fifth level</a:t>
             </a:r>
             <a:endParaRPr lang="en-GB"/>
@@ -1604,7 +1612,7 @@
           <a:p>
             <a:fld id="{69793EBB-23D2-486D-A26A-0711F09D4BD5}" type="datetimeFigureOut">
               <a:rPr lang="en-GB" smtClean="0"/>
-              <a:t>12/10/2016</a:t>
+              <a:t>14/10/2018</a:t>
             </a:fld>
             <a:endParaRPr lang="en-GB"/>
           </a:p>
@@ -1698,7 +1706,7 @@
           <a:lstStyle/>
           <a:p>
             <a:r>
-              <a:rPr lang="en-US" smtClean="0"/>
+              <a:rPr lang="en-US"/>
               <a:t>Click to edit Master title style</a:t>
             </a:r>
             <a:endParaRPr lang="en-GB"/>
@@ -1722,7 +1730,7 @@
           <a:p>
             <a:fld id="{69793EBB-23D2-486D-A26A-0711F09D4BD5}" type="datetimeFigureOut">
               <a:rPr lang="en-GB" smtClean="0"/>
-              <a:t>12/10/2016</a:t>
+              <a:t>14/10/2018</a:t>
             </a:fld>
             <a:endParaRPr lang="en-GB"/>
           </a:p>
@@ -1817,7 +1825,7 @@
           <a:p>
             <a:fld id="{69793EBB-23D2-486D-A26A-0711F09D4BD5}" type="datetimeFigureOut">
               <a:rPr lang="en-GB" smtClean="0"/>
-              <a:t>12/10/2016</a:t>
+              <a:t>14/10/2018</a:t>
             </a:fld>
             <a:endParaRPr lang="en-GB"/>
           </a:p>
@@ -1920,7 +1928,7 @@
           </a:lstStyle>
           <a:p>
             <a:r>
-              <a:rPr lang="en-US" smtClean="0"/>
+              <a:rPr lang="en-US"/>
               <a:t>Click to edit Master title style</a:t>
             </a:r>
             <a:endParaRPr lang="en-GB"/>
@@ -1977,35 +1985,35 @@
           <a:p>
             <a:pPr lvl="0"/>
             <a:r>
-              <a:rPr lang="en-US" smtClean="0"/>
+              <a:rPr lang="en-US"/>
               <a:t>Click to edit Master text styles</a:t>
             </a:r>
           </a:p>
           <a:p>
             <a:pPr lvl="1"/>
             <a:r>
-              <a:rPr lang="en-US" smtClean="0"/>
+              <a:rPr lang="en-US"/>
               <a:t>Second level</a:t>
             </a:r>
           </a:p>
           <a:p>
             <a:pPr lvl="2"/>
             <a:r>
-              <a:rPr lang="en-US" smtClean="0"/>
+              <a:rPr lang="en-US"/>
               <a:t>Third level</a:t>
             </a:r>
           </a:p>
           <a:p>
             <a:pPr lvl="3"/>
             <a:r>
-              <a:rPr lang="en-US" smtClean="0"/>
+              <a:rPr lang="en-US"/>
               <a:t>Fourth level</a:t>
             </a:r>
           </a:p>
           <a:p>
             <a:pPr lvl="4"/>
             <a:r>
-              <a:rPr lang="en-US" smtClean="0"/>
+              <a:rPr lang="en-US"/>
               <a:t>Fifth level</a:t>
             </a:r>
             <a:endParaRPr lang="en-GB"/>
@@ -2071,7 +2079,7 @@
           <a:p>
             <a:pPr lvl="0"/>
             <a:r>
-              <a:rPr lang="en-US" smtClean="0"/>
+              <a:rPr lang="en-US"/>
               <a:t>Click to edit Master text styles</a:t>
             </a:r>
           </a:p>
@@ -2094,7 +2102,7 @@
           <a:p>
             <a:fld id="{69793EBB-23D2-486D-A26A-0711F09D4BD5}" type="datetimeFigureOut">
               <a:rPr lang="en-GB" smtClean="0"/>
-              <a:t>12/10/2016</a:t>
+              <a:t>14/10/2018</a:t>
             </a:fld>
             <a:endParaRPr lang="en-GB"/>
           </a:p>
@@ -2197,7 +2205,7 @@
           </a:lstStyle>
           <a:p>
             <a:r>
-              <a:rPr lang="en-US" smtClean="0"/>
+              <a:rPr lang="en-US"/>
               <a:t>Click to edit Master title style</a:t>
             </a:r>
             <a:endParaRPr lang="en-GB"/>
@@ -2324,7 +2332,7 @@
           <a:p>
             <a:pPr lvl="0"/>
             <a:r>
-              <a:rPr lang="en-US" smtClean="0"/>
+              <a:rPr lang="en-US"/>
               <a:t>Click to edit Master text styles</a:t>
             </a:r>
           </a:p>
@@ -2347,7 +2355,7 @@
           <a:p>
             <a:fld id="{69793EBB-23D2-486D-A26A-0711F09D4BD5}" type="datetimeFigureOut">
               <a:rPr lang="en-GB" smtClean="0"/>
-              <a:t>12/10/2016</a:t>
+              <a:t>14/10/2018</a:t>
             </a:fld>
             <a:endParaRPr lang="en-GB"/>
           </a:p>
@@ -2456,7 +2464,7 @@
           <a:lstStyle/>
           <a:p>
             <a:r>
-              <a:rPr lang="en-US" smtClean="0"/>
+              <a:rPr lang="en-US"/>
               <a:t>Click to edit Master title style</a:t>
             </a:r>
             <a:endParaRPr lang="en-GB"/>
@@ -2490,35 +2498,35 @@
           <a:p>
             <a:pPr lvl="0"/>
             <a:r>
-              <a:rPr lang="en-US" smtClean="0"/>
+              <a:rPr lang="en-US"/>
               <a:t>Click to edit Master text styles</a:t>
             </a:r>
           </a:p>
           <a:p>
             <a:pPr lvl="1"/>
             <a:r>
-              <a:rPr lang="en-US" smtClean="0"/>
+              <a:rPr lang="en-US"/>
               <a:t>Second level</a:t>
             </a:r>
           </a:p>
           <a:p>
             <a:pPr lvl="2"/>
             <a:r>
-              <a:rPr lang="en-US" smtClean="0"/>
+              <a:rPr lang="en-US"/>
               <a:t>Third level</a:t>
             </a:r>
           </a:p>
           <a:p>
             <a:pPr lvl="3"/>
             <a:r>
-              <a:rPr lang="en-US" smtClean="0"/>
+              <a:rPr lang="en-US"/>
               <a:t>Fourth level</a:t>
             </a:r>
           </a:p>
           <a:p>
             <a:pPr lvl="4"/>
             <a:r>
-              <a:rPr lang="en-US" smtClean="0"/>
+              <a:rPr lang="en-US"/>
               <a:t>Fifth level</a:t>
             </a:r>
             <a:endParaRPr lang="en-GB"/>
@@ -2560,7 +2568,7 @@
           <a:p>
             <a:fld id="{69793EBB-23D2-486D-A26A-0711F09D4BD5}" type="datetimeFigureOut">
               <a:rPr lang="en-GB" smtClean="0"/>
-              <a:t>12/10/2016</a:t>
+              <a:t>14/10/2018</a:t>
             </a:fld>
             <a:endParaRPr lang="en-GB"/>
           </a:p>
@@ -3058,10 +3066,9 @@
           <a:lstStyle/>
           <a:p>
             <a:r>
-              <a:rPr lang="en-GB" dirty="0" smtClean="0"/>
+              <a:rPr lang="en-GB" dirty="0"/>
               <a:t>D</a:t>
             </a:r>
-            <a:endParaRPr lang="en-GB" dirty="0"/>
           </a:p>
         </p:txBody>
       </p:sp>
@@ -3120,7 +3127,6 @@
               <a:rPr lang="en-GB" dirty="0"/>
               <a:t>B</a:t>
             </a:r>
-            <a:endParaRPr lang="en-GB" dirty="0"/>
           </a:p>
         </p:txBody>
       </p:sp>
@@ -3147,10 +3153,9 @@
           <a:lstStyle/>
           <a:p>
             <a:r>
-              <a:rPr lang="en-GB" dirty="0" smtClean="0"/>
+              <a:rPr lang="en-GB" dirty="0"/>
               <a:t>E</a:t>
             </a:r>
-            <a:endParaRPr lang="en-GB" dirty="0"/>
           </a:p>
         </p:txBody>
       </p:sp>
@@ -3177,10 +3182,9 @@
           <a:lstStyle/>
           <a:p>
             <a:r>
-              <a:rPr lang="en-GB" dirty="0" smtClean="0"/>
+              <a:rPr lang="en-GB" dirty="0"/>
               <a:t>G</a:t>
             </a:r>
-            <a:endParaRPr lang="en-GB" dirty="0"/>
           </a:p>
         </p:txBody>
       </p:sp>
@@ -3207,10 +3211,9 @@
           <a:lstStyle/>
           <a:p>
             <a:r>
-              <a:rPr lang="en-GB" dirty="0" smtClean="0"/>
+              <a:rPr lang="en-GB" dirty="0"/>
               <a:t>H</a:t>
             </a:r>
-            <a:endParaRPr lang="en-GB" dirty="0"/>
           </a:p>
         </p:txBody>
       </p:sp>
@@ -3237,11 +3240,11 @@
           <a:lstStyle/>
           <a:p>
             <a:r>
-              <a:rPr lang="en-GB" dirty="0" smtClean="0"/>
+              <a:rPr lang="en-GB" dirty="0"/>
               <a:t>F </a:t>
             </a:r>
             <a:r>
-              <a:rPr lang="en-GB" sz="1200" dirty="0" smtClean="0"/>
+              <a:rPr lang="en-GB" sz="1200" dirty="0"/>
               <a:t>(behind)</a:t>
             </a:r>
             <a:endParaRPr lang="en-GB" dirty="0"/>
@@ -3393,10 +3396,9 @@
           <a:lstStyle/>
           <a:p>
             <a:r>
-              <a:rPr lang="en-GB" dirty="0" smtClean="0"/>
+              <a:rPr lang="en-GB" dirty="0"/>
               <a:t>A</a:t>
             </a:r>
-            <a:endParaRPr lang="en-GB" dirty="0"/>
           </a:p>
         </p:txBody>
       </p:sp>
@@ -3423,10 +3425,9 @@
           <a:lstStyle/>
           <a:p>
             <a:r>
-              <a:rPr lang="en-GB" dirty="0" smtClean="0"/>
+              <a:rPr lang="en-GB" dirty="0"/>
               <a:t>D</a:t>
             </a:r>
-            <a:endParaRPr lang="en-GB" dirty="0"/>
           </a:p>
         </p:txBody>
       </p:sp>
@@ -3456,7 +3457,6 @@
               <a:rPr lang="en-GB" dirty="0"/>
               <a:t>C</a:t>
             </a:r>
-            <a:endParaRPr lang="en-GB" dirty="0"/>
           </a:p>
         </p:txBody>
       </p:sp>
@@ -3483,10 +3483,9 @@
           <a:lstStyle/>
           <a:p>
             <a:r>
-              <a:rPr lang="en-GB" dirty="0" smtClean="0"/>
+              <a:rPr lang="en-GB" dirty="0"/>
               <a:t>B</a:t>
             </a:r>
-            <a:endParaRPr lang="en-GB" dirty="0"/>
           </a:p>
         </p:txBody>
       </p:sp>
@@ -3556,10 +3555,4093 @@
           <a:chExt cx="0" cy="0"/>
         </a:xfrm>
       </p:grpSpPr>
+      <p:graphicFrame>
+        <p:nvGraphicFramePr>
+          <p:cNvPr id="2" name="Table 1">
+            <a:extLst>
+              <a:ext uri="{FF2B5EF4-FFF2-40B4-BE49-F238E27FC236}">
+                <a16:creationId xmlns:a16="http://schemas.microsoft.com/office/drawing/2014/main" id="{AD96BCE0-8DCA-4093-A3BE-26CBFA29C773}"/>
+              </a:ext>
+            </a:extLst>
+          </p:cNvPr>
+          <p:cNvGraphicFramePr>
+            <a:graphicFrameLocks noGrp="1"/>
+          </p:cNvGraphicFramePr>
+          <p:nvPr>
+            <p:extLst>
+              <p:ext uri="{D42A27DB-BD31-4B8C-83A1-F6EECF244321}">
+                <p14:modId xmlns:p14="http://schemas.microsoft.com/office/powerpoint/2010/main" val="1547998007"/>
+              </p:ext>
+            </p:extLst>
+          </p:nvPr>
+        </p:nvGraphicFramePr>
+        <p:xfrm>
+          <a:off x="909637" y="917046"/>
+          <a:ext cx="10372726" cy="5023908"/>
+        </p:xfrm>
+        <a:graphic>
+          <a:graphicData uri="http://schemas.openxmlformats.org/drawingml/2006/table">
+            <a:tbl>
+              <a:tblPr firstRow="1" bandRow="1">
+                <a:tableStyleId>{5940675A-B579-460E-94D1-54222C63F5DA}</a:tableStyleId>
+              </a:tblPr>
+              <a:tblGrid>
+                <a:gridCol w="1481818">
+                  <a:extLst>
+                    <a:ext uri="{9D8B030D-6E8A-4147-A177-3AD203B41FA5}">
+                      <a16:colId xmlns:a16="http://schemas.microsoft.com/office/drawing/2014/main" val="3582919249"/>
+                    </a:ext>
+                  </a:extLst>
+                </a:gridCol>
+                <a:gridCol w="1481818">
+                  <a:extLst>
+                    <a:ext uri="{9D8B030D-6E8A-4147-A177-3AD203B41FA5}">
+                      <a16:colId xmlns:a16="http://schemas.microsoft.com/office/drawing/2014/main" val="3770908203"/>
+                    </a:ext>
+                  </a:extLst>
+                </a:gridCol>
+                <a:gridCol w="1481818">
+                  <a:extLst>
+                    <a:ext uri="{9D8B030D-6E8A-4147-A177-3AD203B41FA5}">
+                      <a16:colId xmlns:a16="http://schemas.microsoft.com/office/drawing/2014/main" val="1708705948"/>
+                    </a:ext>
+                  </a:extLst>
+                </a:gridCol>
+                <a:gridCol w="1481818">
+                  <a:extLst>
+                    <a:ext uri="{9D8B030D-6E8A-4147-A177-3AD203B41FA5}">
+                      <a16:colId xmlns:a16="http://schemas.microsoft.com/office/drawing/2014/main" val="555709313"/>
+                    </a:ext>
+                  </a:extLst>
+                </a:gridCol>
+                <a:gridCol w="1481818">
+                  <a:extLst>
+                    <a:ext uri="{9D8B030D-6E8A-4147-A177-3AD203B41FA5}">
+                      <a16:colId xmlns:a16="http://schemas.microsoft.com/office/drawing/2014/main" val="276516747"/>
+                    </a:ext>
+                  </a:extLst>
+                </a:gridCol>
+                <a:gridCol w="1481818">
+                  <a:extLst>
+                    <a:ext uri="{9D8B030D-6E8A-4147-A177-3AD203B41FA5}">
+                      <a16:colId xmlns:a16="http://schemas.microsoft.com/office/drawing/2014/main" val="2355060899"/>
+                    </a:ext>
+                  </a:extLst>
+                </a:gridCol>
+                <a:gridCol w="1481818">
+                  <a:extLst>
+                    <a:ext uri="{9D8B030D-6E8A-4147-A177-3AD203B41FA5}">
+                      <a16:colId xmlns:a16="http://schemas.microsoft.com/office/drawing/2014/main" val="2526681808"/>
+                    </a:ext>
+                  </a:extLst>
+                </a:gridCol>
+              </a:tblGrid>
+              <a:tr h="1674636">
+                <a:tc>
+                  <a:txBody>
+                    <a:bodyPr/>
+                    <a:lstStyle/>
+                    <a:p>
+                      <a:endParaRPr lang="en-GB" dirty="0"/>
+                    </a:p>
+                  </a:txBody>
+                  <a:tcPr/>
+                </a:tc>
+                <a:tc>
+                  <a:txBody>
+                    <a:bodyPr/>
+                    <a:lstStyle/>
+                    <a:p>
+                      <a:endParaRPr lang="en-GB"/>
+                    </a:p>
+                  </a:txBody>
+                  <a:tcPr/>
+                </a:tc>
+                <a:tc>
+                  <a:txBody>
+                    <a:bodyPr/>
+                    <a:lstStyle/>
+                    <a:p>
+                      <a:endParaRPr lang="en-GB"/>
+                    </a:p>
+                  </a:txBody>
+                  <a:tcPr/>
+                </a:tc>
+                <a:tc>
+                  <a:txBody>
+                    <a:bodyPr/>
+                    <a:lstStyle/>
+                    <a:p>
+                      <a:endParaRPr lang="en-GB"/>
+                    </a:p>
+                  </a:txBody>
+                  <a:tcPr/>
+                </a:tc>
+                <a:tc>
+                  <a:txBody>
+                    <a:bodyPr/>
+                    <a:lstStyle/>
+                    <a:p>
+                      <a:endParaRPr lang="en-GB"/>
+                    </a:p>
+                  </a:txBody>
+                  <a:tcPr/>
+                </a:tc>
+                <a:tc>
+                  <a:txBody>
+                    <a:bodyPr/>
+                    <a:lstStyle/>
+                    <a:p>
+                      <a:endParaRPr lang="en-GB"/>
+                    </a:p>
+                  </a:txBody>
+                  <a:tcPr/>
+                </a:tc>
+                <a:tc>
+                  <a:txBody>
+                    <a:bodyPr/>
+                    <a:lstStyle/>
+                    <a:p>
+                      <a:endParaRPr lang="en-GB"/>
+                    </a:p>
+                  </a:txBody>
+                  <a:tcPr/>
+                </a:tc>
+                <a:extLst>
+                  <a:ext uri="{0D108BD9-81ED-4DB2-BD59-A6C34878D82A}">
+                    <a16:rowId xmlns:a16="http://schemas.microsoft.com/office/drawing/2014/main" val="1076018968"/>
+                  </a:ext>
+                </a:extLst>
+              </a:tr>
+              <a:tr h="1674636">
+                <a:tc>
+                  <a:txBody>
+                    <a:bodyPr/>
+                    <a:lstStyle/>
+                    <a:p>
+                      <a:endParaRPr lang="en-GB" dirty="0"/>
+                    </a:p>
+                  </a:txBody>
+                  <a:tcPr/>
+                </a:tc>
+                <a:tc>
+                  <a:txBody>
+                    <a:bodyPr/>
+                    <a:lstStyle/>
+                    <a:p>
+                      <a:endParaRPr lang="en-GB" dirty="0"/>
+                    </a:p>
+                  </a:txBody>
+                  <a:tcPr/>
+                </a:tc>
+                <a:tc>
+                  <a:txBody>
+                    <a:bodyPr/>
+                    <a:lstStyle/>
+                    <a:p>
+                      <a:endParaRPr lang="en-GB"/>
+                    </a:p>
+                  </a:txBody>
+                  <a:tcPr/>
+                </a:tc>
+                <a:tc>
+                  <a:txBody>
+                    <a:bodyPr/>
+                    <a:lstStyle/>
+                    <a:p>
+                      <a:endParaRPr lang="en-GB"/>
+                    </a:p>
+                  </a:txBody>
+                  <a:tcPr/>
+                </a:tc>
+                <a:tc>
+                  <a:txBody>
+                    <a:bodyPr/>
+                    <a:lstStyle/>
+                    <a:p>
+                      <a:endParaRPr lang="en-GB"/>
+                    </a:p>
+                  </a:txBody>
+                  <a:tcPr/>
+                </a:tc>
+                <a:tc>
+                  <a:txBody>
+                    <a:bodyPr/>
+                    <a:lstStyle/>
+                    <a:p>
+                      <a:endParaRPr lang="en-GB"/>
+                    </a:p>
+                  </a:txBody>
+                  <a:tcPr/>
+                </a:tc>
+                <a:tc>
+                  <a:txBody>
+                    <a:bodyPr/>
+                    <a:lstStyle/>
+                    <a:p>
+                      <a:endParaRPr lang="en-GB" dirty="0"/>
+                    </a:p>
+                  </a:txBody>
+                  <a:tcPr/>
+                </a:tc>
+                <a:extLst>
+                  <a:ext uri="{0D108BD9-81ED-4DB2-BD59-A6C34878D82A}">
+                    <a16:rowId xmlns:a16="http://schemas.microsoft.com/office/drawing/2014/main" val="1901692041"/>
+                  </a:ext>
+                </a:extLst>
+              </a:tr>
+              <a:tr h="1674636">
+                <a:tc>
+                  <a:txBody>
+                    <a:bodyPr/>
+                    <a:lstStyle/>
+                    <a:p>
+                      <a:endParaRPr lang="en-GB"/>
+                    </a:p>
+                  </a:txBody>
+                  <a:tcPr/>
+                </a:tc>
+                <a:tc>
+                  <a:txBody>
+                    <a:bodyPr/>
+                    <a:lstStyle/>
+                    <a:p>
+                      <a:pPr algn="ctr"/>
+                      <a:endParaRPr lang="en-GB" dirty="0"/>
+                    </a:p>
+                  </a:txBody>
+                  <a:tcPr/>
+                </a:tc>
+                <a:tc>
+                  <a:txBody>
+                    <a:bodyPr/>
+                    <a:lstStyle/>
+                    <a:p>
+                      <a:endParaRPr lang="en-GB"/>
+                    </a:p>
+                  </a:txBody>
+                  <a:tcPr/>
+                </a:tc>
+                <a:tc>
+                  <a:txBody>
+                    <a:bodyPr/>
+                    <a:lstStyle/>
+                    <a:p>
+                      <a:endParaRPr lang="en-GB"/>
+                    </a:p>
+                  </a:txBody>
+                  <a:tcPr/>
+                </a:tc>
+                <a:tc>
+                  <a:txBody>
+                    <a:bodyPr/>
+                    <a:lstStyle/>
+                    <a:p>
+                      <a:endParaRPr lang="en-GB"/>
+                    </a:p>
+                  </a:txBody>
+                  <a:tcPr/>
+                </a:tc>
+                <a:tc>
+                  <a:txBody>
+                    <a:bodyPr/>
+                    <a:lstStyle/>
+                    <a:p>
+                      <a:endParaRPr lang="en-GB" dirty="0"/>
+                    </a:p>
+                  </a:txBody>
+                  <a:tcPr/>
+                </a:tc>
+                <a:tc>
+                  <a:txBody>
+                    <a:bodyPr/>
+                    <a:lstStyle/>
+                    <a:p>
+                      <a:endParaRPr lang="en-GB" dirty="0"/>
+                    </a:p>
+                  </a:txBody>
+                  <a:tcPr/>
+                </a:tc>
+                <a:extLst>
+                  <a:ext uri="{0D108BD9-81ED-4DB2-BD59-A6C34878D82A}">
+                    <a16:rowId xmlns:a16="http://schemas.microsoft.com/office/drawing/2014/main" val="1696806090"/>
+                  </a:ext>
+                </a:extLst>
+              </a:tr>
+            </a:tbl>
+          </a:graphicData>
+        </a:graphic>
+      </p:graphicFrame>
+      <p:grpSp>
+        <p:nvGrpSpPr>
+          <p:cNvPr id="14" name="Group 13">
+            <a:extLst>
+              <a:ext uri="{FF2B5EF4-FFF2-40B4-BE49-F238E27FC236}">
+                <a16:creationId xmlns:a16="http://schemas.microsoft.com/office/drawing/2014/main" id="{7161D0B6-8FFB-4F12-8327-DC4C26AB6AE6}"/>
+              </a:ext>
+            </a:extLst>
+          </p:cNvPr>
+          <p:cNvGrpSpPr/>
+          <p:nvPr/>
+        </p:nvGrpSpPr>
+        <p:grpSpPr>
+          <a:xfrm>
+            <a:off x="171451" y="1328737"/>
+            <a:ext cx="645682" cy="4200526"/>
+            <a:chOff x="171451" y="1328737"/>
+            <a:chExt cx="645682" cy="4200526"/>
+          </a:xfrm>
+        </p:grpSpPr>
+        <p:sp>
+          <p:nvSpPr>
+            <p:cNvPr id="3" name="TextBox 2">
+              <a:extLst>
+                <a:ext uri="{FF2B5EF4-FFF2-40B4-BE49-F238E27FC236}">
+                  <a16:creationId xmlns:a16="http://schemas.microsoft.com/office/drawing/2014/main" id="{6E4D7D60-0018-4CA9-92C6-D8707AFDFB29}"/>
+                </a:ext>
+              </a:extLst>
+            </p:cNvPr>
+            <p:cNvSpPr txBox="1"/>
+            <p:nvPr/>
+          </p:nvSpPr>
+          <p:spPr>
+            <a:xfrm>
+              <a:off x="171451" y="1328737"/>
+              <a:ext cx="601447" cy="646331"/>
+            </a:xfrm>
+            <a:prstGeom prst="rect">
+              <a:avLst/>
+            </a:prstGeom>
+            <a:noFill/>
+          </p:spPr>
+          <p:txBody>
+            <a:bodyPr wrap="none" rtlCol="0">
+              <a:spAutoFit/>
+            </a:bodyPr>
+            <a:lstStyle/>
+            <a:p>
+              <a:r>
+                <a:rPr lang="en-GB" sz="3600" dirty="0">
+                  <a:solidFill>
+                    <a:srgbClr val="FF0000"/>
+                  </a:solidFill>
+                </a:rPr>
+                <a:t>V</a:t>
+              </a:r>
+              <a:r>
+                <a:rPr lang="en-GB" sz="3600" baseline="-25000" dirty="0">
+                  <a:solidFill>
+                    <a:srgbClr val="FF0000"/>
+                  </a:solidFill>
+                </a:rPr>
+                <a:t>0</a:t>
+              </a:r>
+            </a:p>
+          </p:txBody>
+        </p:sp>
+        <p:sp>
+          <p:nvSpPr>
+            <p:cNvPr id="4" name="TextBox 3">
+              <a:extLst>
+                <a:ext uri="{FF2B5EF4-FFF2-40B4-BE49-F238E27FC236}">
+                  <a16:creationId xmlns:a16="http://schemas.microsoft.com/office/drawing/2014/main" id="{99B42F8C-3382-46B9-A6DA-AC85A64BC10D}"/>
+                </a:ext>
+              </a:extLst>
+            </p:cNvPr>
+            <p:cNvSpPr txBox="1"/>
+            <p:nvPr/>
+          </p:nvSpPr>
+          <p:spPr>
+            <a:xfrm>
+              <a:off x="187111" y="3105834"/>
+              <a:ext cx="601447" cy="646331"/>
+            </a:xfrm>
+            <a:prstGeom prst="rect">
+              <a:avLst/>
+            </a:prstGeom>
+            <a:noFill/>
+          </p:spPr>
+          <p:txBody>
+            <a:bodyPr wrap="none" rtlCol="0">
+              <a:spAutoFit/>
+            </a:bodyPr>
+            <a:lstStyle/>
+            <a:p>
+              <a:r>
+                <a:rPr lang="en-GB" sz="3600" dirty="0">
+                  <a:solidFill>
+                    <a:srgbClr val="FF0000"/>
+                  </a:solidFill>
+                </a:rPr>
+                <a:t>V</a:t>
+              </a:r>
+              <a:r>
+                <a:rPr lang="en-GB" sz="3600" baseline="-25000" dirty="0">
+                  <a:solidFill>
+                    <a:srgbClr val="FF0000"/>
+                  </a:solidFill>
+                </a:rPr>
+                <a:t>1</a:t>
+              </a:r>
+            </a:p>
+          </p:txBody>
+        </p:sp>
+        <p:sp>
+          <p:nvSpPr>
+            <p:cNvPr id="5" name="TextBox 4">
+              <a:extLst>
+                <a:ext uri="{FF2B5EF4-FFF2-40B4-BE49-F238E27FC236}">
+                  <a16:creationId xmlns:a16="http://schemas.microsoft.com/office/drawing/2014/main" id="{5704A7A7-6B30-495C-AD45-8E05B21EA416}"/>
+                </a:ext>
+              </a:extLst>
+            </p:cNvPr>
+            <p:cNvSpPr txBox="1"/>
+            <p:nvPr/>
+          </p:nvSpPr>
+          <p:spPr>
+            <a:xfrm>
+              <a:off x="215686" y="4882932"/>
+              <a:ext cx="601447" cy="646331"/>
+            </a:xfrm>
+            <a:prstGeom prst="rect">
+              <a:avLst/>
+            </a:prstGeom>
+            <a:noFill/>
+          </p:spPr>
+          <p:txBody>
+            <a:bodyPr wrap="none" rtlCol="0">
+              <a:spAutoFit/>
+            </a:bodyPr>
+            <a:lstStyle/>
+            <a:p>
+              <a:r>
+                <a:rPr lang="en-GB" sz="3600" dirty="0">
+                  <a:solidFill>
+                    <a:srgbClr val="FF0000"/>
+                  </a:solidFill>
+                </a:rPr>
+                <a:t>V</a:t>
+              </a:r>
+              <a:r>
+                <a:rPr lang="en-GB" sz="3600" baseline="-25000" dirty="0">
+                  <a:solidFill>
+                    <a:srgbClr val="FF0000"/>
+                  </a:solidFill>
+                </a:rPr>
+                <a:t>2</a:t>
+              </a:r>
+            </a:p>
+          </p:txBody>
+        </p:sp>
+      </p:grpSp>
+      <p:grpSp>
+        <p:nvGrpSpPr>
+          <p:cNvPr id="13" name="Group 12">
+            <a:extLst>
+              <a:ext uri="{FF2B5EF4-FFF2-40B4-BE49-F238E27FC236}">
+                <a16:creationId xmlns:a16="http://schemas.microsoft.com/office/drawing/2014/main" id="{91027474-AC00-4A33-A8F1-1E77C4530785}"/>
+              </a:ext>
+            </a:extLst>
+          </p:cNvPr>
+          <p:cNvGrpSpPr/>
+          <p:nvPr/>
+        </p:nvGrpSpPr>
+        <p:grpSpPr>
+          <a:xfrm>
+            <a:off x="1395414" y="135929"/>
+            <a:ext cx="9213802" cy="672756"/>
+            <a:chOff x="1395414" y="135929"/>
+            <a:chExt cx="9213802" cy="672756"/>
+          </a:xfrm>
+        </p:grpSpPr>
+        <p:sp>
+          <p:nvSpPr>
+            <p:cNvPr id="6" name="TextBox 5">
+              <a:extLst>
+                <a:ext uri="{FF2B5EF4-FFF2-40B4-BE49-F238E27FC236}">
+                  <a16:creationId xmlns:a16="http://schemas.microsoft.com/office/drawing/2014/main" id="{7E6B55AA-4BD3-4735-9EC5-BF48C4F6ECCF}"/>
+                </a:ext>
+              </a:extLst>
+            </p:cNvPr>
+            <p:cNvSpPr txBox="1"/>
+            <p:nvPr/>
+          </p:nvSpPr>
+          <p:spPr>
+            <a:xfrm>
+              <a:off x="1395414" y="142128"/>
+              <a:ext cx="423514" cy="646331"/>
+            </a:xfrm>
+            <a:prstGeom prst="rect">
+              <a:avLst/>
+            </a:prstGeom>
+            <a:noFill/>
+          </p:spPr>
+          <p:txBody>
+            <a:bodyPr wrap="none" rtlCol="0">
+              <a:spAutoFit/>
+            </a:bodyPr>
+            <a:lstStyle/>
+            <a:p>
+              <a:r>
+                <a:rPr lang="en-GB" sz="3600" dirty="0">
+                  <a:solidFill>
+                    <a:srgbClr val="FF0000"/>
+                  </a:solidFill>
+                </a:rPr>
+                <a:t>X</a:t>
+              </a:r>
+              <a:endParaRPr lang="en-GB" sz="3600" baseline="-25000" dirty="0">
+                <a:solidFill>
+                  <a:srgbClr val="FF0000"/>
+                </a:solidFill>
+              </a:endParaRPr>
+            </a:p>
+          </p:txBody>
+        </p:sp>
+        <p:sp>
+          <p:nvSpPr>
+            <p:cNvPr id="7" name="TextBox 6">
+              <a:extLst>
+                <a:ext uri="{FF2B5EF4-FFF2-40B4-BE49-F238E27FC236}">
+                  <a16:creationId xmlns:a16="http://schemas.microsoft.com/office/drawing/2014/main" id="{B7F8DA87-164C-4C99-A855-688C4BB9CDD1}"/>
+                </a:ext>
+              </a:extLst>
+            </p:cNvPr>
+            <p:cNvSpPr txBox="1"/>
+            <p:nvPr/>
+          </p:nvSpPr>
+          <p:spPr>
+            <a:xfrm>
+              <a:off x="2819402" y="142127"/>
+              <a:ext cx="409086" cy="646331"/>
+            </a:xfrm>
+            <a:prstGeom prst="rect">
+              <a:avLst/>
+            </a:prstGeom>
+            <a:noFill/>
+          </p:spPr>
+          <p:txBody>
+            <a:bodyPr wrap="none" rtlCol="0">
+              <a:spAutoFit/>
+            </a:bodyPr>
+            <a:lstStyle/>
+            <a:p>
+              <a:r>
+                <a:rPr lang="en-GB" sz="3600" dirty="0">
+                  <a:solidFill>
+                    <a:srgbClr val="FF0000"/>
+                  </a:solidFill>
+                </a:rPr>
+                <a:t>Y</a:t>
+              </a:r>
+              <a:endParaRPr lang="en-GB" sz="3600" baseline="-25000" dirty="0">
+                <a:solidFill>
+                  <a:srgbClr val="FF0000"/>
+                </a:solidFill>
+              </a:endParaRPr>
+            </a:p>
+          </p:txBody>
+        </p:sp>
+        <p:sp>
+          <p:nvSpPr>
+            <p:cNvPr id="8" name="TextBox 7">
+              <a:extLst>
+                <a:ext uri="{FF2B5EF4-FFF2-40B4-BE49-F238E27FC236}">
+                  <a16:creationId xmlns:a16="http://schemas.microsoft.com/office/drawing/2014/main" id="{31784F42-9784-42FF-8E20-EB476085D37F}"/>
+                </a:ext>
+              </a:extLst>
+            </p:cNvPr>
+            <p:cNvSpPr txBox="1"/>
+            <p:nvPr/>
+          </p:nvSpPr>
+          <p:spPr>
+            <a:xfrm>
+              <a:off x="4228962" y="142126"/>
+              <a:ext cx="401072" cy="646331"/>
+            </a:xfrm>
+            <a:prstGeom prst="rect">
+              <a:avLst/>
+            </a:prstGeom>
+            <a:noFill/>
+          </p:spPr>
+          <p:txBody>
+            <a:bodyPr wrap="none" rtlCol="0">
+              <a:spAutoFit/>
+            </a:bodyPr>
+            <a:lstStyle/>
+            <a:p>
+              <a:r>
+                <a:rPr lang="en-GB" sz="3600" dirty="0">
+                  <a:solidFill>
+                    <a:srgbClr val="FF0000"/>
+                  </a:solidFill>
+                </a:rPr>
+                <a:t>Z</a:t>
+              </a:r>
+              <a:endParaRPr lang="en-GB" sz="3600" baseline="-25000" dirty="0">
+                <a:solidFill>
+                  <a:srgbClr val="FF0000"/>
+                </a:solidFill>
+              </a:endParaRPr>
+            </a:p>
+          </p:txBody>
+        </p:sp>
+        <p:sp>
+          <p:nvSpPr>
+            <p:cNvPr id="9" name="TextBox 8">
+              <a:extLst>
+                <a:ext uri="{FF2B5EF4-FFF2-40B4-BE49-F238E27FC236}">
+                  <a16:creationId xmlns:a16="http://schemas.microsoft.com/office/drawing/2014/main" id="{E4D8761F-2E03-4135-B53C-DA676F151D76}"/>
+                </a:ext>
+              </a:extLst>
+            </p:cNvPr>
+            <p:cNvSpPr txBox="1"/>
+            <p:nvPr/>
+          </p:nvSpPr>
+          <p:spPr>
+            <a:xfrm>
+              <a:off x="5686914" y="142126"/>
+              <a:ext cx="434734" cy="646331"/>
+            </a:xfrm>
+            <a:prstGeom prst="rect">
+              <a:avLst/>
+            </a:prstGeom>
+            <a:noFill/>
+          </p:spPr>
+          <p:txBody>
+            <a:bodyPr wrap="none" rtlCol="0">
+              <a:spAutoFit/>
+            </a:bodyPr>
+            <a:lstStyle/>
+            <a:p>
+              <a:r>
+                <a:rPr lang="en-GB" sz="3600" dirty="0">
+                  <a:solidFill>
+                    <a:srgbClr val="FF0000"/>
+                  </a:solidFill>
+                </a:rPr>
+                <a:t>R</a:t>
+              </a:r>
+              <a:endParaRPr lang="en-GB" sz="3600" baseline="-25000" dirty="0">
+                <a:solidFill>
+                  <a:srgbClr val="FF0000"/>
+                </a:solidFill>
+              </a:endParaRPr>
+            </a:p>
+          </p:txBody>
+        </p:sp>
+        <p:sp>
+          <p:nvSpPr>
+            <p:cNvPr id="10" name="TextBox 9">
+              <a:extLst>
+                <a:ext uri="{FF2B5EF4-FFF2-40B4-BE49-F238E27FC236}">
+                  <a16:creationId xmlns:a16="http://schemas.microsoft.com/office/drawing/2014/main" id="{DA43F5FC-1BF3-4438-BF09-4A712BB936CA}"/>
+                </a:ext>
+              </a:extLst>
+            </p:cNvPr>
+            <p:cNvSpPr txBox="1"/>
+            <p:nvPr/>
+          </p:nvSpPr>
+          <p:spPr>
+            <a:xfrm>
+              <a:off x="7186192" y="135929"/>
+              <a:ext cx="476412" cy="646331"/>
+            </a:xfrm>
+            <a:prstGeom prst="rect">
+              <a:avLst/>
+            </a:prstGeom>
+            <a:noFill/>
+          </p:spPr>
+          <p:txBody>
+            <a:bodyPr wrap="none" rtlCol="0">
+              <a:spAutoFit/>
+            </a:bodyPr>
+            <a:lstStyle/>
+            <a:p>
+              <a:r>
+                <a:rPr lang="en-GB" sz="3600" dirty="0">
+                  <a:solidFill>
+                    <a:srgbClr val="FF0000"/>
+                  </a:solidFill>
+                </a:rPr>
+                <a:t>G</a:t>
+              </a:r>
+              <a:endParaRPr lang="en-GB" sz="3600" baseline="-25000" dirty="0">
+                <a:solidFill>
+                  <a:srgbClr val="FF0000"/>
+                </a:solidFill>
+              </a:endParaRPr>
+            </a:p>
+          </p:txBody>
+        </p:sp>
+        <p:sp>
+          <p:nvSpPr>
+            <p:cNvPr id="11" name="TextBox 10">
+              <a:extLst>
+                <a:ext uri="{FF2B5EF4-FFF2-40B4-BE49-F238E27FC236}">
+                  <a16:creationId xmlns:a16="http://schemas.microsoft.com/office/drawing/2014/main" id="{2B4FFB84-BF75-48C6-A678-0DDE22523F4E}"/>
+                </a:ext>
+              </a:extLst>
+            </p:cNvPr>
+            <p:cNvSpPr txBox="1"/>
+            <p:nvPr/>
+          </p:nvSpPr>
+          <p:spPr>
+            <a:xfrm>
+              <a:off x="8706237" y="162354"/>
+              <a:ext cx="394900" cy="646331"/>
+            </a:xfrm>
+            <a:prstGeom prst="rect">
+              <a:avLst/>
+            </a:prstGeom>
+            <a:noFill/>
+          </p:spPr>
+          <p:txBody>
+            <a:bodyPr wrap="square" rtlCol="0">
+              <a:spAutoFit/>
+            </a:bodyPr>
+            <a:lstStyle/>
+            <a:p>
+              <a:r>
+                <a:rPr lang="en-GB" sz="3600" dirty="0">
+                  <a:solidFill>
+                    <a:srgbClr val="FF0000"/>
+                  </a:solidFill>
+                </a:rPr>
+                <a:t>B</a:t>
+              </a:r>
+              <a:endParaRPr lang="en-GB" sz="3600" baseline="-25000" dirty="0">
+                <a:solidFill>
+                  <a:srgbClr val="FF0000"/>
+                </a:solidFill>
+              </a:endParaRPr>
+            </a:p>
+          </p:txBody>
+        </p:sp>
+        <p:sp>
+          <p:nvSpPr>
+            <p:cNvPr id="12" name="TextBox 11">
+              <a:extLst>
+                <a:ext uri="{FF2B5EF4-FFF2-40B4-BE49-F238E27FC236}">
+                  <a16:creationId xmlns:a16="http://schemas.microsoft.com/office/drawing/2014/main" id="{8F1FC395-128F-411C-82F0-9FB5A8061FD1}"/>
+                </a:ext>
+              </a:extLst>
+            </p:cNvPr>
+            <p:cNvSpPr txBox="1"/>
+            <p:nvPr/>
+          </p:nvSpPr>
+          <p:spPr>
+            <a:xfrm>
+              <a:off x="10156848" y="135929"/>
+              <a:ext cx="452368" cy="646331"/>
+            </a:xfrm>
+            <a:prstGeom prst="rect">
+              <a:avLst/>
+            </a:prstGeom>
+            <a:noFill/>
+          </p:spPr>
+          <p:txBody>
+            <a:bodyPr wrap="none" rtlCol="0">
+              <a:spAutoFit/>
+            </a:bodyPr>
+            <a:lstStyle/>
+            <a:p>
+              <a:r>
+                <a:rPr lang="en-GB" sz="3600" dirty="0">
+                  <a:solidFill>
+                    <a:srgbClr val="FF0000"/>
+                  </a:solidFill>
+                </a:rPr>
+                <a:t>A</a:t>
+              </a:r>
+              <a:endParaRPr lang="en-GB" sz="3600" baseline="-25000" dirty="0">
+                <a:solidFill>
+                  <a:srgbClr val="FF0000"/>
+                </a:solidFill>
+              </a:endParaRPr>
+            </a:p>
+          </p:txBody>
+        </p:sp>
+      </p:grpSp>
     </p:spTree>
     <p:extLst>
       <p:ext uri="{BB962C8B-B14F-4D97-AF65-F5344CB8AC3E}">
         <p14:creationId xmlns:p14="http://schemas.microsoft.com/office/powerpoint/2010/main" val="4130856907"/>
+      </p:ext>
+    </p:extLst>
+  </p:cSld>
+  <p:clrMapOvr>
+    <a:masterClrMapping/>
+  </p:clrMapOvr>
+</p:sld>
+</file>
+
+<file path=ppt/slides/slide3.xml><?xml version="1.0" encoding="utf-8"?>
+<p:sld xmlns:a="http://schemas.openxmlformats.org/drawingml/2006/main" xmlns:r="http://schemas.openxmlformats.org/officeDocument/2006/relationships" xmlns:p="http://schemas.openxmlformats.org/presentationml/2006/main">
+  <p:cSld>
+    <p:spTree>
+      <p:nvGrpSpPr>
+        <p:cNvPr id="1" name=""/>
+        <p:cNvGrpSpPr/>
+        <p:nvPr/>
+      </p:nvGrpSpPr>
+      <p:grpSpPr>
+        <a:xfrm>
+          <a:off x="0" y="0"/>
+          <a:ext cx="0" cy="0"/>
+          <a:chOff x="0" y="0"/>
+          <a:chExt cx="0" cy="0"/>
+        </a:xfrm>
+      </p:grpSpPr>
+      <p:graphicFrame>
+        <p:nvGraphicFramePr>
+          <p:cNvPr id="2" name="Table 1">
+            <a:extLst>
+              <a:ext uri="{FF2B5EF4-FFF2-40B4-BE49-F238E27FC236}">
+                <a16:creationId xmlns:a16="http://schemas.microsoft.com/office/drawing/2014/main" id="{AD96BCE0-8DCA-4093-A3BE-26CBFA29C773}"/>
+              </a:ext>
+            </a:extLst>
+          </p:cNvPr>
+          <p:cNvGraphicFramePr>
+            <a:graphicFrameLocks noGrp="1"/>
+          </p:cNvGraphicFramePr>
+          <p:nvPr>
+            <p:extLst>
+              <p:ext uri="{D42A27DB-BD31-4B8C-83A1-F6EECF244321}">
+                <p14:modId xmlns:p14="http://schemas.microsoft.com/office/powerpoint/2010/main" val="2505113537"/>
+              </p:ext>
+            </p:extLst>
+          </p:nvPr>
+        </p:nvGraphicFramePr>
+        <p:xfrm>
+          <a:off x="909637" y="917046"/>
+          <a:ext cx="10372726" cy="5023908"/>
+        </p:xfrm>
+        <a:graphic>
+          <a:graphicData uri="http://schemas.openxmlformats.org/drawingml/2006/table">
+            <a:tbl>
+              <a:tblPr firstRow="1" bandRow="1">
+                <a:tableStyleId>{5940675A-B579-460E-94D1-54222C63F5DA}</a:tableStyleId>
+              </a:tblPr>
+              <a:tblGrid>
+                <a:gridCol w="1481818">
+                  <a:extLst>
+                    <a:ext uri="{9D8B030D-6E8A-4147-A177-3AD203B41FA5}">
+                      <a16:colId xmlns:a16="http://schemas.microsoft.com/office/drawing/2014/main" val="3582919249"/>
+                    </a:ext>
+                  </a:extLst>
+                </a:gridCol>
+                <a:gridCol w="1481818">
+                  <a:extLst>
+                    <a:ext uri="{9D8B030D-6E8A-4147-A177-3AD203B41FA5}">
+                      <a16:colId xmlns:a16="http://schemas.microsoft.com/office/drawing/2014/main" val="3770908203"/>
+                    </a:ext>
+                  </a:extLst>
+                </a:gridCol>
+                <a:gridCol w="1481818">
+                  <a:extLst>
+                    <a:ext uri="{9D8B030D-6E8A-4147-A177-3AD203B41FA5}">
+                      <a16:colId xmlns:a16="http://schemas.microsoft.com/office/drawing/2014/main" val="1708705948"/>
+                    </a:ext>
+                  </a:extLst>
+                </a:gridCol>
+                <a:gridCol w="1481818">
+                  <a:extLst>
+                    <a:ext uri="{9D8B030D-6E8A-4147-A177-3AD203B41FA5}">
+                      <a16:colId xmlns:a16="http://schemas.microsoft.com/office/drawing/2014/main" val="555709313"/>
+                    </a:ext>
+                  </a:extLst>
+                </a:gridCol>
+                <a:gridCol w="1481818">
+                  <a:extLst>
+                    <a:ext uri="{9D8B030D-6E8A-4147-A177-3AD203B41FA5}">
+                      <a16:colId xmlns:a16="http://schemas.microsoft.com/office/drawing/2014/main" val="276516747"/>
+                    </a:ext>
+                  </a:extLst>
+                </a:gridCol>
+                <a:gridCol w="1481818">
+                  <a:extLst>
+                    <a:ext uri="{9D8B030D-6E8A-4147-A177-3AD203B41FA5}">
+                      <a16:colId xmlns:a16="http://schemas.microsoft.com/office/drawing/2014/main" val="2355060899"/>
+                    </a:ext>
+                  </a:extLst>
+                </a:gridCol>
+                <a:gridCol w="1481818">
+                  <a:extLst>
+                    <a:ext uri="{9D8B030D-6E8A-4147-A177-3AD203B41FA5}">
+                      <a16:colId xmlns:a16="http://schemas.microsoft.com/office/drawing/2014/main" val="2526681808"/>
+                    </a:ext>
+                  </a:extLst>
+                </a:gridCol>
+              </a:tblGrid>
+              <a:tr h="1674636">
+                <a:tc>
+                  <a:txBody>
+                    <a:bodyPr/>
+                    <a:lstStyle/>
+                    <a:p>
+                      <a:pPr algn="ctr"/>
+                      <a:r>
+                        <a:rPr lang="en-GB" sz="4800" dirty="0"/>
+                        <a:t>-0.5</a:t>
+                      </a:r>
+                    </a:p>
+                  </a:txBody>
+                  <a:tcPr anchor="ctr"/>
+                </a:tc>
+                <a:tc>
+                  <a:txBody>
+                    <a:bodyPr/>
+                    <a:lstStyle/>
+                    <a:p>
+                      <a:pPr algn="ctr"/>
+                      <a:r>
+                        <a:rPr lang="en-GB" sz="4800" dirty="0"/>
+                        <a:t>-0.5</a:t>
+                      </a:r>
+                    </a:p>
+                  </a:txBody>
+                  <a:tcPr anchor="ctr"/>
+                </a:tc>
+                <a:tc>
+                  <a:txBody>
+                    <a:bodyPr/>
+                    <a:lstStyle/>
+                    <a:p>
+                      <a:pPr algn="ctr"/>
+                      <a:r>
+                        <a:rPr lang="en-GB" sz="4800" dirty="0"/>
+                        <a:t>0.0</a:t>
+                      </a:r>
+                    </a:p>
+                  </a:txBody>
+                  <a:tcPr anchor="ctr"/>
+                </a:tc>
+                <a:tc>
+                  <a:txBody>
+                    <a:bodyPr/>
+                    <a:lstStyle/>
+                    <a:p>
+                      <a:pPr algn="ctr"/>
+                      <a:r>
+                        <a:rPr lang="en-GB" sz="4800" dirty="0"/>
+                        <a:t>1.0</a:t>
+                      </a:r>
+                    </a:p>
+                  </a:txBody>
+                  <a:tcPr anchor="ctr"/>
+                </a:tc>
+                <a:tc>
+                  <a:txBody>
+                    <a:bodyPr/>
+                    <a:lstStyle/>
+                    <a:p>
+                      <a:pPr algn="ctr"/>
+                      <a:r>
+                        <a:rPr lang="en-GB" sz="4800" dirty="0"/>
+                        <a:t>0.0</a:t>
+                      </a:r>
+                    </a:p>
+                  </a:txBody>
+                  <a:tcPr anchor="ctr"/>
+                </a:tc>
+                <a:tc>
+                  <a:txBody>
+                    <a:bodyPr/>
+                    <a:lstStyle/>
+                    <a:p>
+                      <a:pPr algn="ctr"/>
+                      <a:r>
+                        <a:rPr lang="en-GB" sz="4800" dirty="0"/>
+                        <a:t>0.0</a:t>
+                      </a:r>
+                    </a:p>
+                  </a:txBody>
+                  <a:tcPr anchor="ctr"/>
+                </a:tc>
+                <a:tc>
+                  <a:txBody>
+                    <a:bodyPr/>
+                    <a:lstStyle/>
+                    <a:p>
+                      <a:pPr algn="ctr"/>
+                      <a:r>
+                        <a:rPr lang="en-GB" sz="4800" dirty="0"/>
+                        <a:t>1.0</a:t>
+                      </a:r>
+                    </a:p>
+                  </a:txBody>
+                  <a:tcPr anchor="ctr"/>
+                </a:tc>
+                <a:extLst>
+                  <a:ext uri="{0D108BD9-81ED-4DB2-BD59-A6C34878D82A}">
+                    <a16:rowId xmlns:a16="http://schemas.microsoft.com/office/drawing/2014/main" val="1076018968"/>
+                  </a:ext>
+                </a:extLst>
+              </a:tr>
+              <a:tr h="1674636">
+                <a:tc>
+                  <a:txBody>
+                    <a:bodyPr/>
+                    <a:lstStyle/>
+                    <a:p>
+                      <a:pPr algn="ctr"/>
+                      <a:r>
+                        <a:rPr lang="en-GB" sz="4800" dirty="0"/>
+                        <a:t>0.5</a:t>
+                      </a:r>
+                    </a:p>
+                  </a:txBody>
+                  <a:tcPr anchor="ctr"/>
+                </a:tc>
+                <a:tc>
+                  <a:txBody>
+                    <a:bodyPr/>
+                    <a:lstStyle/>
+                    <a:p>
+                      <a:pPr algn="ctr"/>
+                      <a:r>
+                        <a:rPr lang="en-GB" sz="4800" dirty="0"/>
+                        <a:t>-0.5</a:t>
+                      </a:r>
+                    </a:p>
+                  </a:txBody>
+                  <a:tcPr anchor="ctr"/>
+                </a:tc>
+                <a:tc>
+                  <a:txBody>
+                    <a:bodyPr/>
+                    <a:lstStyle/>
+                    <a:p>
+                      <a:pPr algn="ctr"/>
+                      <a:r>
+                        <a:rPr lang="en-GB" sz="4800" dirty="0"/>
+                        <a:t>0.0</a:t>
+                      </a:r>
+                    </a:p>
+                  </a:txBody>
+                  <a:tcPr anchor="ctr"/>
+                </a:tc>
+                <a:tc>
+                  <a:txBody>
+                    <a:bodyPr/>
+                    <a:lstStyle/>
+                    <a:p>
+                      <a:pPr algn="ctr"/>
+                      <a:r>
+                        <a:rPr lang="en-GB" sz="4800" dirty="0"/>
+                        <a:t>0.0</a:t>
+                      </a:r>
+                    </a:p>
+                  </a:txBody>
+                  <a:tcPr anchor="ctr"/>
+                </a:tc>
+                <a:tc>
+                  <a:txBody>
+                    <a:bodyPr/>
+                    <a:lstStyle/>
+                    <a:p>
+                      <a:pPr algn="ctr"/>
+                      <a:r>
+                        <a:rPr lang="en-GB" sz="4800" dirty="0"/>
+                        <a:t>1.1</a:t>
+                      </a:r>
+                    </a:p>
+                  </a:txBody>
+                  <a:tcPr anchor="ctr"/>
+                </a:tc>
+                <a:tc>
+                  <a:txBody>
+                    <a:bodyPr/>
+                    <a:lstStyle/>
+                    <a:p>
+                      <a:pPr algn="ctr"/>
+                      <a:r>
+                        <a:rPr lang="en-GB" sz="4800" dirty="0"/>
+                        <a:t>0.0</a:t>
+                      </a:r>
+                    </a:p>
+                  </a:txBody>
+                  <a:tcPr anchor="ctr"/>
+                </a:tc>
+                <a:tc>
+                  <a:txBody>
+                    <a:bodyPr/>
+                    <a:lstStyle/>
+                    <a:p>
+                      <a:pPr algn="ctr"/>
+                      <a:r>
+                        <a:rPr lang="en-GB" sz="4800" dirty="0"/>
+                        <a:t>1.0</a:t>
+                      </a:r>
+                    </a:p>
+                  </a:txBody>
+                  <a:tcPr anchor="ctr"/>
+                </a:tc>
+                <a:extLst>
+                  <a:ext uri="{0D108BD9-81ED-4DB2-BD59-A6C34878D82A}">
+                    <a16:rowId xmlns:a16="http://schemas.microsoft.com/office/drawing/2014/main" val="1901692041"/>
+                  </a:ext>
+                </a:extLst>
+              </a:tr>
+              <a:tr h="1674636">
+                <a:tc>
+                  <a:txBody>
+                    <a:bodyPr/>
+                    <a:lstStyle/>
+                    <a:p>
+                      <a:pPr algn="ctr"/>
+                      <a:r>
+                        <a:rPr lang="en-GB" sz="4800" dirty="0"/>
+                        <a:t>0.0</a:t>
+                      </a:r>
+                    </a:p>
+                  </a:txBody>
+                  <a:tcPr anchor="ctr"/>
+                </a:tc>
+                <a:tc>
+                  <a:txBody>
+                    <a:bodyPr/>
+                    <a:lstStyle/>
+                    <a:p>
+                      <a:pPr algn="ctr"/>
+                      <a:r>
+                        <a:rPr lang="en-GB" sz="4800" dirty="0"/>
+                        <a:t>0.2</a:t>
+                      </a:r>
+                    </a:p>
+                  </a:txBody>
+                  <a:tcPr anchor="ctr"/>
+                </a:tc>
+                <a:tc>
+                  <a:txBody>
+                    <a:bodyPr/>
+                    <a:lstStyle/>
+                    <a:p>
+                      <a:pPr algn="ctr"/>
+                      <a:r>
+                        <a:rPr lang="en-GB" sz="4800" dirty="0"/>
+                        <a:t>0.0</a:t>
+                      </a:r>
+                    </a:p>
+                  </a:txBody>
+                  <a:tcPr anchor="ctr"/>
+                </a:tc>
+                <a:tc>
+                  <a:txBody>
+                    <a:bodyPr/>
+                    <a:lstStyle/>
+                    <a:p>
+                      <a:pPr algn="ctr"/>
+                      <a:r>
+                        <a:rPr lang="en-GB" sz="4800" dirty="0"/>
+                        <a:t>0.0</a:t>
+                      </a:r>
+                    </a:p>
+                  </a:txBody>
+                  <a:tcPr anchor="ctr"/>
+                </a:tc>
+                <a:tc>
+                  <a:txBody>
+                    <a:bodyPr/>
+                    <a:lstStyle/>
+                    <a:p>
+                      <a:pPr algn="ctr"/>
+                      <a:r>
+                        <a:rPr lang="en-GB" sz="4800" dirty="0"/>
+                        <a:t>0.0</a:t>
+                      </a:r>
+                    </a:p>
+                  </a:txBody>
+                  <a:tcPr anchor="ctr"/>
+                </a:tc>
+                <a:tc>
+                  <a:txBody>
+                    <a:bodyPr/>
+                    <a:lstStyle/>
+                    <a:p>
+                      <a:pPr algn="ctr"/>
+                      <a:r>
+                        <a:rPr lang="en-GB" sz="4800" dirty="0"/>
+                        <a:t>1.0</a:t>
+                      </a:r>
+                    </a:p>
+                  </a:txBody>
+                  <a:tcPr anchor="ctr"/>
+                </a:tc>
+                <a:tc>
+                  <a:txBody>
+                    <a:bodyPr/>
+                    <a:lstStyle/>
+                    <a:p>
+                      <a:pPr algn="ctr"/>
+                      <a:r>
+                        <a:rPr lang="en-GB" sz="4800" dirty="0"/>
+                        <a:t>1.0</a:t>
+                      </a:r>
+                    </a:p>
+                  </a:txBody>
+                  <a:tcPr anchor="ctr"/>
+                </a:tc>
+                <a:extLst>
+                  <a:ext uri="{0D108BD9-81ED-4DB2-BD59-A6C34878D82A}">
+                    <a16:rowId xmlns:a16="http://schemas.microsoft.com/office/drawing/2014/main" val="1696806090"/>
+                  </a:ext>
+                </a:extLst>
+              </a:tr>
+            </a:tbl>
+          </a:graphicData>
+        </a:graphic>
+      </p:graphicFrame>
+      <p:grpSp>
+        <p:nvGrpSpPr>
+          <p:cNvPr id="14" name="Group 13">
+            <a:extLst>
+              <a:ext uri="{FF2B5EF4-FFF2-40B4-BE49-F238E27FC236}">
+                <a16:creationId xmlns:a16="http://schemas.microsoft.com/office/drawing/2014/main" id="{7161D0B6-8FFB-4F12-8327-DC4C26AB6AE6}"/>
+              </a:ext>
+            </a:extLst>
+          </p:cNvPr>
+          <p:cNvGrpSpPr/>
+          <p:nvPr/>
+        </p:nvGrpSpPr>
+        <p:grpSpPr>
+          <a:xfrm>
+            <a:off x="171451" y="1328737"/>
+            <a:ext cx="645682" cy="4200526"/>
+            <a:chOff x="171451" y="1328737"/>
+            <a:chExt cx="645682" cy="4200526"/>
+          </a:xfrm>
+        </p:grpSpPr>
+        <p:sp>
+          <p:nvSpPr>
+            <p:cNvPr id="3" name="TextBox 2">
+              <a:extLst>
+                <a:ext uri="{FF2B5EF4-FFF2-40B4-BE49-F238E27FC236}">
+                  <a16:creationId xmlns:a16="http://schemas.microsoft.com/office/drawing/2014/main" id="{6E4D7D60-0018-4CA9-92C6-D8707AFDFB29}"/>
+                </a:ext>
+              </a:extLst>
+            </p:cNvPr>
+            <p:cNvSpPr txBox="1"/>
+            <p:nvPr/>
+          </p:nvSpPr>
+          <p:spPr>
+            <a:xfrm>
+              <a:off x="171451" y="1328737"/>
+              <a:ext cx="601447" cy="646331"/>
+            </a:xfrm>
+            <a:prstGeom prst="rect">
+              <a:avLst/>
+            </a:prstGeom>
+            <a:noFill/>
+          </p:spPr>
+          <p:txBody>
+            <a:bodyPr wrap="none" rtlCol="0">
+              <a:spAutoFit/>
+            </a:bodyPr>
+            <a:lstStyle/>
+            <a:p>
+              <a:r>
+                <a:rPr lang="en-GB" sz="3600" dirty="0">
+                  <a:solidFill>
+                    <a:srgbClr val="FF0000"/>
+                  </a:solidFill>
+                </a:rPr>
+                <a:t>V</a:t>
+              </a:r>
+              <a:r>
+                <a:rPr lang="en-GB" sz="3600" baseline="-25000" dirty="0">
+                  <a:solidFill>
+                    <a:srgbClr val="FF0000"/>
+                  </a:solidFill>
+                </a:rPr>
+                <a:t>0</a:t>
+              </a:r>
+            </a:p>
+          </p:txBody>
+        </p:sp>
+        <p:sp>
+          <p:nvSpPr>
+            <p:cNvPr id="4" name="TextBox 3">
+              <a:extLst>
+                <a:ext uri="{FF2B5EF4-FFF2-40B4-BE49-F238E27FC236}">
+                  <a16:creationId xmlns:a16="http://schemas.microsoft.com/office/drawing/2014/main" id="{99B42F8C-3382-46B9-A6DA-AC85A64BC10D}"/>
+                </a:ext>
+              </a:extLst>
+            </p:cNvPr>
+            <p:cNvSpPr txBox="1"/>
+            <p:nvPr/>
+          </p:nvSpPr>
+          <p:spPr>
+            <a:xfrm>
+              <a:off x="187111" y="3105834"/>
+              <a:ext cx="601447" cy="646331"/>
+            </a:xfrm>
+            <a:prstGeom prst="rect">
+              <a:avLst/>
+            </a:prstGeom>
+            <a:noFill/>
+          </p:spPr>
+          <p:txBody>
+            <a:bodyPr wrap="none" rtlCol="0">
+              <a:spAutoFit/>
+            </a:bodyPr>
+            <a:lstStyle/>
+            <a:p>
+              <a:r>
+                <a:rPr lang="en-GB" sz="3600" dirty="0">
+                  <a:solidFill>
+                    <a:srgbClr val="FF0000"/>
+                  </a:solidFill>
+                </a:rPr>
+                <a:t>V</a:t>
+              </a:r>
+              <a:r>
+                <a:rPr lang="en-GB" sz="3600" baseline="-25000" dirty="0">
+                  <a:solidFill>
+                    <a:srgbClr val="FF0000"/>
+                  </a:solidFill>
+                </a:rPr>
+                <a:t>1</a:t>
+              </a:r>
+            </a:p>
+          </p:txBody>
+        </p:sp>
+        <p:sp>
+          <p:nvSpPr>
+            <p:cNvPr id="5" name="TextBox 4">
+              <a:extLst>
+                <a:ext uri="{FF2B5EF4-FFF2-40B4-BE49-F238E27FC236}">
+                  <a16:creationId xmlns:a16="http://schemas.microsoft.com/office/drawing/2014/main" id="{5704A7A7-6B30-495C-AD45-8E05B21EA416}"/>
+                </a:ext>
+              </a:extLst>
+            </p:cNvPr>
+            <p:cNvSpPr txBox="1"/>
+            <p:nvPr/>
+          </p:nvSpPr>
+          <p:spPr>
+            <a:xfrm>
+              <a:off x="215686" y="4882932"/>
+              <a:ext cx="601447" cy="646331"/>
+            </a:xfrm>
+            <a:prstGeom prst="rect">
+              <a:avLst/>
+            </a:prstGeom>
+            <a:noFill/>
+          </p:spPr>
+          <p:txBody>
+            <a:bodyPr wrap="none" rtlCol="0">
+              <a:spAutoFit/>
+            </a:bodyPr>
+            <a:lstStyle/>
+            <a:p>
+              <a:r>
+                <a:rPr lang="en-GB" sz="3600" dirty="0">
+                  <a:solidFill>
+                    <a:srgbClr val="FF0000"/>
+                  </a:solidFill>
+                </a:rPr>
+                <a:t>V</a:t>
+              </a:r>
+              <a:r>
+                <a:rPr lang="en-GB" sz="3600" baseline="-25000" dirty="0">
+                  <a:solidFill>
+                    <a:srgbClr val="FF0000"/>
+                  </a:solidFill>
+                </a:rPr>
+                <a:t>2</a:t>
+              </a:r>
+            </a:p>
+          </p:txBody>
+        </p:sp>
+      </p:grpSp>
+      <p:grpSp>
+        <p:nvGrpSpPr>
+          <p:cNvPr id="13" name="Group 12">
+            <a:extLst>
+              <a:ext uri="{FF2B5EF4-FFF2-40B4-BE49-F238E27FC236}">
+                <a16:creationId xmlns:a16="http://schemas.microsoft.com/office/drawing/2014/main" id="{91027474-AC00-4A33-A8F1-1E77C4530785}"/>
+              </a:ext>
+            </a:extLst>
+          </p:cNvPr>
+          <p:cNvGrpSpPr/>
+          <p:nvPr/>
+        </p:nvGrpSpPr>
+        <p:grpSpPr>
+          <a:xfrm>
+            <a:off x="1395414" y="135929"/>
+            <a:ext cx="9213802" cy="672756"/>
+            <a:chOff x="1395414" y="135929"/>
+            <a:chExt cx="9213802" cy="672756"/>
+          </a:xfrm>
+        </p:grpSpPr>
+        <p:sp>
+          <p:nvSpPr>
+            <p:cNvPr id="6" name="TextBox 5">
+              <a:extLst>
+                <a:ext uri="{FF2B5EF4-FFF2-40B4-BE49-F238E27FC236}">
+                  <a16:creationId xmlns:a16="http://schemas.microsoft.com/office/drawing/2014/main" id="{7E6B55AA-4BD3-4735-9EC5-BF48C4F6ECCF}"/>
+                </a:ext>
+              </a:extLst>
+            </p:cNvPr>
+            <p:cNvSpPr txBox="1"/>
+            <p:nvPr/>
+          </p:nvSpPr>
+          <p:spPr>
+            <a:xfrm>
+              <a:off x="1395414" y="142128"/>
+              <a:ext cx="423514" cy="646331"/>
+            </a:xfrm>
+            <a:prstGeom prst="rect">
+              <a:avLst/>
+            </a:prstGeom>
+            <a:noFill/>
+          </p:spPr>
+          <p:txBody>
+            <a:bodyPr wrap="none" rtlCol="0">
+              <a:spAutoFit/>
+            </a:bodyPr>
+            <a:lstStyle/>
+            <a:p>
+              <a:r>
+                <a:rPr lang="en-GB" sz="3600" dirty="0">
+                  <a:solidFill>
+                    <a:srgbClr val="FF0000"/>
+                  </a:solidFill>
+                </a:rPr>
+                <a:t>X</a:t>
+              </a:r>
+              <a:endParaRPr lang="en-GB" sz="3600" baseline="-25000" dirty="0">
+                <a:solidFill>
+                  <a:srgbClr val="FF0000"/>
+                </a:solidFill>
+              </a:endParaRPr>
+            </a:p>
+          </p:txBody>
+        </p:sp>
+        <p:sp>
+          <p:nvSpPr>
+            <p:cNvPr id="7" name="TextBox 6">
+              <a:extLst>
+                <a:ext uri="{FF2B5EF4-FFF2-40B4-BE49-F238E27FC236}">
+                  <a16:creationId xmlns:a16="http://schemas.microsoft.com/office/drawing/2014/main" id="{B7F8DA87-164C-4C99-A855-688C4BB9CDD1}"/>
+                </a:ext>
+              </a:extLst>
+            </p:cNvPr>
+            <p:cNvSpPr txBox="1"/>
+            <p:nvPr/>
+          </p:nvSpPr>
+          <p:spPr>
+            <a:xfrm>
+              <a:off x="2819402" y="142127"/>
+              <a:ext cx="409086" cy="646331"/>
+            </a:xfrm>
+            <a:prstGeom prst="rect">
+              <a:avLst/>
+            </a:prstGeom>
+            <a:noFill/>
+          </p:spPr>
+          <p:txBody>
+            <a:bodyPr wrap="none" rtlCol="0">
+              <a:spAutoFit/>
+            </a:bodyPr>
+            <a:lstStyle/>
+            <a:p>
+              <a:r>
+                <a:rPr lang="en-GB" sz="3600" dirty="0">
+                  <a:solidFill>
+                    <a:srgbClr val="FF0000"/>
+                  </a:solidFill>
+                </a:rPr>
+                <a:t>Y</a:t>
+              </a:r>
+              <a:endParaRPr lang="en-GB" sz="3600" baseline="-25000" dirty="0">
+                <a:solidFill>
+                  <a:srgbClr val="FF0000"/>
+                </a:solidFill>
+              </a:endParaRPr>
+            </a:p>
+          </p:txBody>
+        </p:sp>
+        <p:sp>
+          <p:nvSpPr>
+            <p:cNvPr id="8" name="TextBox 7">
+              <a:extLst>
+                <a:ext uri="{FF2B5EF4-FFF2-40B4-BE49-F238E27FC236}">
+                  <a16:creationId xmlns:a16="http://schemas.microsoft.com/office/drawing/2014/main" id="{31784F42-9784-42FF-8E20-EB476085D37F}"/>
+                </a:ext>
+              </a:extLst>
+            </p:cNvPr>
+            <p:cNvSpPr txBox="1"/>
+            <p:nvPr/>
+          </p:nvSpPr>
+          <p:spPr>
+            <a:xfrm>
+              <a:off x="4228962" y="142126"/>
+              <a:ext cx="401072" cy="646331"/>
+            </a:xfrm>
+            <a:prstGeom prst="rect">
+              <a:avLst/>
+            </a:prstGeom>
+            <a:noFill/>
+          </p:spPr>
+          <p:txBody>
+            <a:bodyPr wrap="none" rtlCol="0">
+              <a:spAutoFit/>
+            </a:bodyPr>
+            <a:lstStyle/>
+            <a:p>
+              <a:r>
+                <a:rPr lang="en-GB" sz="3600" dirty="0">
+                  <a:solidFill>
+                    <a:srgbClr val="FF0000"/>
+                  </a:solidFill>
+                </a:rPr>
+                <a:t>Z</a:t>
+              </a:r>
+              <a:endParaRPr lang="en-GB" sz="3600" baseline="-25000" dirty="0">
+                <a:solidFill>
+                  <a:srgbClr val="FF0000"/>
+                </a:solidFill>
+              </a:endParaRPr>
+            </a:p>
+          </p:txBody>
+        </p:sp>
+        <p:sp>
+          <p:nvSpPr>
+            <p:cNvPr id="9" name="TextBox 8">
+              <a:extLst>
+                <a:ext uri="{FF2B5EF4-FFF2-40B4-BE49-F238E27FC236}">
+                  <a16:creationId xmlns:a16="http://schemas.microsoft.com/office/drawing/2014/main" id="{E4D8761F-2E03-4135-B53C-DA676F151D76}"/>
+                </a:ext>
+              </a:extLst>
+            </p:cNvPr>
+            <p:cNvSpPr txBox="1"/>
+            <p:nvPr/>
+          </p:nvSpPr>
+          <p:spPr>
+            <a:xfrm>
+              <a:off x="5686914" y="142126"/>
+              <a:ext cx="434734" cy="646331"/>
+            </a:xfrm>
+            <a:prstGeom prst="rect">
+              <a:avLst/>
+            </a:prstGeom>
+            <a:noFill/>
+          </p:spPr>
+          <p:txBody>
+            <a:bodyPr wrap="none" rtlCol="0">
+              <a:spAutoFit/>
+            </a:bodyPr>
+            <a:lstStyle/>
+            <a:p>
+              <a:r>
+                <a:rPr lang="en-GB" sz="3600" dirty="0">
+                  <a:solidFill>
+                    <a:srgbClr val="FF0000"/>
+                  </a:solidFill>
+                </a:rPr>
+                <a:t>R</a:t>
+              </a:r>
+              <a:endParaRPr lang="en-GB" sz="3600" baseline="-25000" dirty="0">
+                <a:solidFill>
+                  <a:srgbClr val="FF0000"/>
+                </a:solidFill>
+              </a:endParaRPr>
+            </a:p>
+          </p:txBody>
+        </p:sp>
+        <p:sp>
+          <p:nvSpPr>
+            <p:cNvPr id="10" name="TextBox 9">
+              <a:extLst>
+                <a:ext uri="{FF2B5EF4-FFF2-40B4-BE49-F238E27FC236}">
+                  <a16:creationId xmlns:a16="http://schemas.microsoft.com/office/drawing/2014/main" id="{DA43F5FC-1BF3-4438-BF09-4A712BB936CA}"/>
+                </a:ext>
+              </a:extLst>
+            </p:cNvPr>
+            <p:cNvSpPr txBox="1"/>
+            <p:nvPr/>
+          </p:nvSpPr>
+          <p:spPr>
+            <a:xfrm>
+              <a:off x="7186192" y="135929"/>
+              <a:ext cx="476412" cy="646331"/>
+            </a:xfrm>
+            <a:prstGeom prst="rect">
+              <a:avLst/>
+            </a:prstGeom>
+            <a:noFill/>
+          </p:spPr>
+          <p:txBody>
+            <a:bodyPr wrap="none" rtlCol="0">
+              <a:spAutoFit/>
+            </a:bodyPr>
+            <a:lstStyle/>
+            <a:p>
+              <a:r>
+                <a:rPr lang="en-GB" sz="3600" dirty="0">
+                  <a:solidFill>
+                    <a:srgbClr val="FF0000"/>
+                  </a:solidFill>
+                </a:rPr>
+                <a:t>G</a:t>
+              </a:r>
+              <a:endParaRPr lang="en-GB" sz="3600" baseline="-25000" dirty="0">
+                <a:solidFill>
+                  <a:srgbClr val="FF0000"/>
+                </a:solidFill>
+              </a:endParaRPr>
+            </a:p>
+          </p:txBody>
+        </p:sp>
+        <p:sp>
+          <p:nvSpPr>
+            <p:cNvPr id="11" name="TextBox 10">
+              <a:extLst>
+                <a:ext uri="{FF2B5EF4-FFF2-40B4-BE49-F238E27FC236}">
+                  <a16:creationId xmlns:a16="http://schemas.microsoft.com/office/drawing/2014/main" id="{2B4FFB84-BF75-48C6-A678-0DDE22523F4E}"/>
+                </a:ext>
+              </a:extLst>
+            </p:cNvPr>
+            <p:cNvSpPr txBox="1"/>
+            <p:nvPr/>
+          </p:nvSpPr>
+          <p:spPr>
+            <a:xfrm>
+              <a:off x="8706237" y="162354"/>
+              <a:ext cx="394900" cy="646331"/>
+            </a:xfrm>
+            <a:prstGeom prst="rect">
+              <a:avLst/>
+            </a:prstGeom>
+            <a:noFill/>
+          </p:spPr>
+          <p:txBody>
+            <a:bodyPr wrap="square" rtlCol="0">
+              <a:spAutoFit/>
+            </a:bodyPr>
+            <a:lstStyle/>
+            <a:p>
+              <a:r>
+                <a:rPr lang="en-GB" sz="3600" dirty="0">
+                  <a:solidFill>
+                    <a:srgbClr val="FF0000"/>
+                  </a:solidFill>
+                </a:rPr>
+                <a:t>B</a:t>
+              </a:r>
+              <a:endParaRPr lang="en-GB" sz="3600" baseline="-25000" dirty="0">
+                <a:solidFill>
+                  <a:srgbClr val="FF0000"/>
+                </a:solidFill>
+              </a:endParaRPr>
+            </a:p>
+          </p:txBody>
+        </p:sp>
+        <p:sp>
+          <p:nvSpPr>
+            <p:cNvPr id="12" name="TextBox 11">
+              <a:extLst>
+                <a:ext uri="{FF2B5EF4-FFF2-40B4-BE49-F238E27FC236}">
+                  <a16:creationId xmlns:a16="http://schemas.microsoft.com/office/drawing/2014/main" id="{8F1FC395-128F-411C-82F0-9FB5A8061FD1}"/>
+                </a:ext>
+              </a:extLst>
+            </p:cNvPr>
+            <p:cNvSpPr txBox="1"/>
+            <p:nvPr/>
+          </p:nvSpPr>
+          <p:spPr>
+            <a:xfrm>
+              <a:off x="10156848" y="135929"/>
+              <a:ext cx="452368" cy="646331"/>
+            </a:xfrm>
+            <a:prstGeom prst="rect">
+              <a:avLst/>
+            </a:prstGeom>
+            <a:noFill/>
+          </p:spPr>
+          <p:txBody>
+            <a:bodyPr wrap="none" rtlCol="0">
+              <a:spAutoFit/>
+            </a:bodyPr>
+            <a:lstStyle/>
+            <a:p>
+              <a:r>
+                <a:rPr lang="en-GB" sz="3600" dirty="0">
+                  <a:solidFill>
+                    <a:srgbClr val="FF0000"/>
+                  </a:solidFill>
+                </a:rPr>
+                <a:t>A</a:t>
+              </a:r>
+              <a:endParaRPr lang="en-GB" sz="3600" baseline="-25000" dirty="0">
+                <a:solidFill>
+                  <a:srgbClr val="FF0000"/>
+                </a:solidFill>
+              </a:endParaRPr>
+            </a:p>
+          </p:txBody>
+        </p:sp>
+      </p:grpSp>
+    </p:spTree>
+    <p:extLst>
+      <p:ext uri="{BB962C8B-B14F-4D97-AF65-F5344CB8AC3E}">
+        <p14:creationId xmlns:p14="http://schemas.microsoft.com/office/powerpoint/2010/main" val="669333829"/>
+      </p:ext>
+    </p:extLst>
+  </p:cSld>
+  <p:clrMapOvr>
+    <a:masterClrMapping/>
+  </p:clrMapOvr>
+</p:sld>
+</file>
+
+<file path=ppt/slides/slide4.xml><?xml version="1.0" encoding="utf-8"?>
+<p:sld xmlns:a="http://schemas.openxmlformats.org/drawingml/2006/main" xmlns:r="http://schemas.openxmlformats.org/officeDocument/2006/relationships" xmlns:p="http://schemas.openxmlformats.org/presentationml/2006/main">
+  <p:cSld>
+    <p:spTree>
+      <p:nvGrpSpPr>
+        <p:cNvPr id="1" name=""/>
+        <p:cNvGrpSpPr/>
+        <p:nvPr/>
+      </p:nvGrpSpPr>
+      <p:grpSpPr>
+        <a:xfrm>
+          <a:off x="0" y="0"/>
+          <a:ext cx="0" cy="0"/>
+          <a:chOff x="0" y="0"/>
+          <a:chExt cx="0" cy="0"/>
+        </a:xfrm>
+      </p:grpSpPr>
+      <p:graphicFrame>
+        <p:nvGraphicFramePr>
+          <p:cNvPr id="2" name="Table 1">
+            <a:extLst>
+              <a:ext uri="{FF2B5EF4-FFF2-40B4-BE49-F238E27FC236}">
+                <a16:creationId xmlns:a16="http://schemas.microsoft.com/office/drawing/2014/main" id="{AD96BCE0-8DCA-4093-A3BE-26CBFA29C773}"/>
+              </a:ext>
+            </a:extLst>
+          </p:cNvPr>
+          <p:cNvGraphicFramePr>
+            <a:graphicFrameLocks noGrp="1"/>
+          </p:cNvGraphicFramePr>
+          <p:nvPr>
+            <p:extLst>
+              <p:ext uri="{D42A27DB-BD31-4B8C-83A1-F6EECF244321}">
+                <p14:modId xmlns:p14="http://schemas.microsoft.com/office/powerpoint/2010/main" val="3937362028"/>
+              </p:ext>
+            </p:extLst>
+          </p:nvPr>
+        </p:nvGraphicFramePr>
+        <p:xfrm>
+          <a:off x="909637" y="917046"/>
+          <a:ext cx="10372726" cy="5023908"/>
+        </p:xfrm>
+        <a:graphic>
+          <a:graphicData uri="http://schemas.openxmlformats.org/drawingml/2006/table">
+            <a:tbl>
+              <a:tblPr firstRow="1" bandRow="1">
+                <a:tableStyleId>{5940675A-B579-460E-94D1-54222C63F5DA}</a:tableStyleId>
+              </a:tblPr>
+              <a:tblGrid>
+                <a:gridCol w="1481818">
+                  <a:extLst>
+                    <a:ext uri="{9D8B030D-6E8A-4147-A177-3AD203B41FA5}">
+                      <a16:colId xmlns:a16="http://schemas.microsoft.com/office/drawing/2014/main" val="3582919249"/>
+                    </a:ext>
+                  </a:extLst>
+                </a:gridCol>
+                <a:gridCol w="1481818">
+                  <a:extLst>
+                    <a:ext uri="{9D8B030D-6E8A-4147-A177-3AD203B41FA5}">
+                      <a16:colId xmlns:a16="http://schemas.microsoft.com/office/drawing/2014/main" val="3770908203"/>
+                    </a:ext>
+                  </a:extLst>
+                </a:gridCol>
+                <a:gridCol w="1481818">
+                  <a:extLst>
+                    <a:ext uri="{9D8B030D-6E8A-4147-A177-3AD203B41FA5}">
+                      <a16:colId xmlns:a16="http://schemas.microsoft.com/office/drawing/2014/main" val="1708705948"/>
+                    </a:ext>
+                  </a:extLst>
+                </a:gridCol>
+                <a:gridCol w="1481818">
+                  <a:extLst>
+                    <a:ext uri="{9D8B030D-6E8A-4147-A177-3AD203B41FA5}">
+                      <a16:colId xmlns:a16="http://schemas.microsoft.com/office/drawing/2014/main" val="555709313"/>
+                    </a:ext>
+                  </a:extLst>
+                </a:gridCol>
+                <a:gridCol w="1481818">
+                  <a:extLst>
+                    <a:ext uri="{9D8B030D-6E8A-4147-A177-3AD203B41FA5}">
+                      <a16:colId xmlns:a16="http://schemas.microsoft.com/office/drawing/2014/main" val="276516747"/>
+                    </a:ext>
+                  </a:extLst>
+                </a:gridCol>
+                <a:gridCol w="1481818">
+                  <a:extLst>
+                    <a:ext uri="{9D8B030D-6E8A-4147-A177-3AD203B41FA5}">
+                      <a16:colId xmlns:a16="http://schemas.microsoft.com/office/drawing/2014/main" val="2355060899"/>
+                    </a:ext>
+                  </a:extLst>
+                </a:gridCol>
+                <a:gridCol w="1481818">
+                  <a:extLst>
+                    <a:ext uri="{9D8B030D-6E8A-4147-A177-3AD203B41FA5}">
+                      <a16:colId xmlns:a16="http://schemas.microsoft.com/office/drawing/2014/main" val="2526681808"/>
+                    </a:ext>
+                  </a:extLst>
+                </a:gridCol>
+              </a:tblGrid>
+              <a:tr h="1674636">
+                <a:tc>
+                  <a:txBody>
+                    <a:bodyPr/>
+                    <a:lstStyle/>
+                    <a:p>
+                      <a:pPr algn="ctr"/>
+                      <a:r>
+                        <a:rPr lang="en-GB" sz="4800" dirty="0"/>
+                        <a:t>-0.5</a:t>
+                      </a:r>
+                    </a:p>
+                  </a:txBody>
+                  <a:tcPr anchor="ctr"/>
+                </a:tc>
+                <a:tc>
+                  <a:txBody>
+                    <a:bodyPr/>
+                    <a:lstStyle/>
+                    <a:p>
+                      <a:pPr algn="ctr"/>
+                      <a:r>
+                        <a:rPr lang="en-GB" sz="4800" dirty="0"/>
+                        <a:t>-0.5</a:t>
+                      </a:r>
+                    </a:p>
+                  </a:txBody>
+                  <a:tcPr anchor="ctr"/>
+                </a:tc>
+                <a:tc>
+                  <a:txBody>
+                    <a:bodyPr/>
+                    <a:lstStyle/>
+                    <a:p>
+                      <a:pPr algn="ctr"/>
+                      <a:r>
+                        <a:rPr lang="en-GB" sz="4800" dirty="0"/>
+                        <a:t>0.0</a:t>
+                      </a:r>
+                    </a:p>
+                  </a:txBody>
+                  <a:tcPr anchor="ctr"/>
+                </a:tc>
+                <a:tc>
+                  <a:txBody>
+                    <a:bodyPr/>
+                    <a:lstStyle/>
+                    <a:p>
+                      <a:pPr algn="ctr"/>
+                      <a:r>
+                        <a:rPr lang="en-GB" sz="4800" dirty="0"/>
+                        <a:t>1.0</a:t>
+                      </a:r>
+                    </a:p>
+                  </a:txBody>
+                  <a:tcPr anchor="ctr"/>
+                </a:tc>
+                <a:tc>
+                  <a:txBody>
+                    <a:bodyPr/>
+                    <a:lstStyle/>
+                    <a:p>
+                      <a:pPr algn="ctr"/>
+                      <a:r>
+                        <a:rPr lang="en-GB" sz="4800" dirty="0"/>
+                        <a:t>0.0</a:t>
+                      </a:r>
+                    </a:p>
+                  </a:txBody>
+                  <a:tcPr anchor="ctr"/>
+                </a:tc>
+                <a:tc>
+                  <a:txBody>
+                    <a:bodyPr/>
+                    <a:lstStyle/>
+                    <a:p>
+                      <a:pPr algn="ctr"/>
+                      <a:r>
+                        <a:rPr lang="en-GB" sz="4800" dirty="0"/>
+                        <a:t>0.0</a:t>
+                      </a:r>
+                    </a:p>
+                  </a:txBody>
+                  <a:tcPr anchor="ctr"/>
+                </a:tc>
+                <a:tc>
+                  <a:txBody>
+                    <a:bodyPr/>
+                    <a:lstStyle/>
+                    <a:p>
+                      <a:pPr algn="ctr"/>
+                      <a:r>
+                        <a:rPr lang="en-GB" sz="4800" dirty="0"/>
+                        <a:t>1.0</a:t>
+                      </a:r>
+                    </a:p>
+                  </a:txBody>
+                  <a:tcPr anchor="ctr"/>
+                </a:tc>
+                <a:extLst>
+                  <a:ext uri="{0D108BD9-81ED-4DB2-BD59-A6C34878D82A}">
+                    <a16:rowId xmlns:a16="http://schemas.microsoft.com/office/drawing/2014/main" val="1076018968"/>
+                  </a:ext>
+                </a:extLst>
+              </a:tr>
+              <a:tr h="1674636">
+                <a:tc>
+                  <a:txBody>
+                    <a:bodyPr/>
+                    <a:lstStyle/>
+                    <a:p>
+                      <a:pPr algn="ctr"/>
+                      <a:r>
+                        <a:rPr lang="en-GB" sz="4800" dirty="0">
+                          <a:solidFill>
+                            <a:schemeClr val="bg1">
+                              <a:lumMod val="85000"/>
+                            </a:schemeClr>
+                          </a:solidFill>
+                        </a:rPr>
+                        <a:t>0.5</a:t>
+                      </a:r>
+                    </a:p>
+                  </a:txBody>
+                  <a:tcPr anchor="ctr"/>
+                </a:tc>
+                <a:tc>
+                  <a:txBody>
+                    <a:bodyPr/>
+                    <a:lstStyle/>
+                    <a:p>
+                      <a:pPr algn="ctr"/>
+                      <a:r>
+                        <a:rPr lang="en-GB" sz="4800" dirty="0">
+                          <a:solidFill>
+                            <a:schemeClr val="bg1">
+                              <a:lumMod val="85000"/>
+                            </a:schemeClr>
+                          </a:solidFill>
+                        </a:rPr>
+                        <a:t>-0.5</a:t>
+                      </a:r>
+                    </a:p>
+                  </a:txBody>
+                  <a:tcPr anchor="ctr"/>
+                </a:tc>
+                <a:tc>
+                  <a:txBody>
+                    <a:bodyPr/>
+                    <a:lstStyle/>
+                    <a:p>
+                      <a:pPr algn="ctr"/>
+                      <a:r>
+                        <a:rPr lang="en-GB" sz="4800" dirty="0">
+                          <a:solidFill>
+                            <a:schemeClr val="bg1">
+                              <a:lumMod val="85000"/>
+                            </a:schemeClr>
+                          </a:solidFill>
+                        </a:rPr>
+                        <a:t>0.0</a:t>
+                      </a:r>
+                    </a:p>
+                  </a:txBody>
+                  <a:tcPr anchor="ctr"/>
+                </a:tc>
+                <a:tc>
+                  <a:txBody>
+                    <a:bodyPr/>
+                    <a:lstStyle/>
+                    <a:p>
+                      <a:pPr algn="ctr"/>
+                      <a:r>
+                        <a:rPr lang="en-GB" sz="4800" dirty="0">
+                          <a:solidFill>
+                            <a:schemeClr val="bg1">
+                              <a:lumMod val="85000"/>
+                            </a:schemeClr>
+                          </a:solidFill>
+                        </a:rPr>
+                        <a:t>0.0</a:t>
+                      </a:r>
+                    </a:p>
+                  </a:txBody>
+                  <a:tcPr anchor="ctr"/>
+                </a:tc>
+                <a:tc>
+                  <a:txBody>
+                    <a:bodyPr/>
+                    <a:lstStyle/>
+                    <a:p>
+                      <a:pPr algn="ctr"/>
+                      <a:r>
+                        <a:rPr lang="en-GB" sz="4800" dirty="0">
+                          <a:solidFill>
+                            <a:schemeClr val="bg1">
+                              <a:lumMod val="85000"/>
+                            </a:schemeClr>
+                          </a:solidFill>
+                        </a:rPr>
+                        <a:t>1.1</a:t>
+                      </a:r>
+                    </a:p>
+                  </a:txBody>
+                  <a:tcPr anchor="ctr"/>
+                </a:tc>
+                <a:tc>
+                  <a:txBody>
+                    <a:bodyPr/>
+                    <a:lstStyle/>
+                    <a:p>
+                      <a:pPr algn="ctr"/>
+                      <a:r>
+                        <a:rPr lang="en-GB" sz="4800" dirty="0">
+                          <a:solidFill>
+                            <a:schemeClr val="bg1">
+                              <a:lumMod val="85000"/>
+                            </a:schemeClr>
+                          </a:solidFill>
+                        </a:rPr>
+                        <a:t>0.0</a:t>
+                      </a:r>
+                    </a:p>
+                  </a:txBody>
+                  <a:tcPr anchor="ctr"/>
+                </a:tc>
+                <a:tc>
+                  <a:txBody>
+                    <a:bodyPr/>
+                    <a:lstStyle/>
+                    <a:p>
+                      <a:pPr algn="ctr"/>
+                      <a:r>
+                        <a:rPr lang="en-GB" sz="4800" dirty="0">
+                          <a:solidFill>
+                            <a:schemeClr val="bg1">
+                              <a:lumMod val="85000"/>
+                            </a:schemeClr>
+                          </a:solidFill>
+                        </a:rPr>
+                        <a:t>1.0</a:t>
+                      </a:r>
+                    </a:p>
+                  </a:txBody>
+                  <a:tcPr anchor="ctr"/>
+                </a:tc>
+                <a:extLst>
+                  <a:ext uri="{0D108BD9-81ED-4DB2-BD59-A6C34878D82A}">
+                    <a16:rowId xmlns:a16="http://schemas.microsoft.com/office/drawing/2014/main" val="1901692041"/>
+                  </a:ext>
+                </a:extLst>
+              </a:tr>
+              <a:tr h="1674636">
+                <a:tc>
+                  <a:txBody>
+                    <a:bodyPr/>
+                    <a:lstStyle/>
+                    <a:p>
+                      <a:pPr algn="ctr"/>
+                      <a:r>
+                        <a:rPr lang="en-GB" sz="4800" dirty="0">
+                          <a:solidFill>
+                            <a:schemeClr val="bg1">
+                              <a:lumMod val="85000"/>
+                            </a:schemeClr>
+                          </a:solidFill>
+                        </a:rPr>
+                        <a:t>0.0</a:t>
+                      </a:r>
+                    </a:p>
+                  </a:txBody>
+                  <a:tcPr anchor="ctr"/>
+                </a:tc>
+                <a:tc>
+                  <a:txBody>
+                    <a:bodyPr/>
+                    <a:lstStyle/>
+                    <a:p>
+                      <a:pPr algn="ctr"/>
+                      <a:r>
+                        <a:rPr lang="en-GB" sz="4800" dirty="0">
+                          <a:solidFill>
+                            <a:schemeClr val="bg1">
+                              <a:lumMod val="85000"/>
+                            </a:schemeClr>
+                          </a:solidFill>
+                        </a:rPr>
+                        <a:t>0.2</a:t>
+                      </a:r>
+                    </a:p>
+                  </a:txBody>
+                  <a:tcPr anchor="ctr"/>
+                </a:tc>
+                <a:tc>
+                  <a:txBody>
+                    <a:bodyPr/>
+                    <a:lstStyle/>
+                    <a:p>
+                      <a:pPr algn="ctr"/>
+                      <a:r>
+                        <a:rPr lang="en-GB" sz="4800" dirty="0">
+                          <a:solidFill>
+                            <a:schemeClr val="bg1">
+                              <a:lumMod val="85000"/>
+                            </a:schemeClr>
+                          </a:solidFill>
+                        </a:rPr>
+                        <a:t>0.0</a:t>
+                      </a:r>
+                    </a:p>
+                  </a:txBody>
+                  <a:tcPr anchor="ctr"/>
+                </a:tc>
+                <a:tc>
+                  <a:txBody>
+                    <a:bodyPr/>
+                    <a:lstStyle/>
+                    <a:p>
+                      <a:pPr algn="ctr"/>
+                      <a:r>
+                        <a:rPr lang="en-GB" sz="4800" dirty="0">
+                          <a:solidFill>
+                            <a:schemeClr val="bg1">
+                              <a:lumMod val="85000"/>
+                            </a:schemeClr>
+                          </a:solidFill>
+                        </a:rPr>
+                        <a:t>0.0</a:t>
+                      </a:r>
+                    </a:p>
+                  </a:txBody>
+                  <a:tcPr anchor="ctr"/>
+                </a:tc>
+                <a:tc>
+                  <a:txBody>
+                    <a:bodyPr/>
+                    <a:lstStyle/>
+                    <a:p>
+                      <a:pPr algn="ctr"/>
+                      <a:r>
+                        <a:rPr lang="en-GB" sz="4800" dirty="0">
+                          <a:solidFill>
+                            <a:schemeClr val="bg1">
+                              <a:lumMod val="85000"/>
+                            </a:schemeClr>
+                          </a:solidFill>
+                        </a:rPr>
+                        <a:t>0.0</a:t>
+                      </a:r>
+                    </a:p>
+                  </a:txBody>
+                  <a:tcPr anchor="ctr"/>
+                </a:tc>
+                <a:tc>
+                  <a:txBody>
+                    <a:bodyPr/>
+                    <a:lstStyle/>
+                    <a:p>
+                      <a:pPr algn="ctr"/>
+                      <a:r>
+                        <a:rPr lang="en-GB" sz="4800" dirty="0">
+                          <a:solidFill>
+                            <a:schemeClr val="bg1">
+                              <a:lumMod val="85000"/>
+                            </a:schemeClr>
+                          </a:solidFill>
+                        </a:rPr>
+                        <a:t>1.0</a:t>
+                      </a:r>
+                    </a:p>
+                  </a:txBody>
+                  <a:tcPr anchor="ctr"/>
+                </a:tc>
+                <a:tc>
+                  <a:txBody>
+                    <a:bodyPr/>
+                    <a:lstStyle/>
+                    <a:p>
+                      <a:pPr algn="ctr"/>
+                      <a:r>
+                        <a:rPr lang="en-GB" sz="4800" dirty="0">
+                          <a:solidFill>
+                            <a:schemeClr val="bg1">
+                              <a:lumMod val="85000"/>
+                            </a:schemeClr>
+                          </a:solidFill>
+                        </a:rPr>
+                        <a:t>1.0</a:t>
+                      </a:r>
+                    </a:p>
+                  </a:txBody>
+                  <a:tcPr anchor="ctr"/>
+                </a:tc>
+                <a:extLst>
+                  <a:ext uri="{0D108BD9-81ED-4DB2-BD59-A6C34878D82A}">
+                    <a16:rowId xmlns:a16="http://schemas.microsoft.com/office/drawing/2014/main" val="1696806090"/>
+                  </a:ext>
+                </a:extLst>
+              </a:tr>
+            </a:tbl>
+          </a:graphicData>
+        </a:graphic>
+      </p:graphicFrame>
+      <p:grpSp>
+        <p:nvGrpSpPr>
+          <p:cNvPr id="14" name="Group 13">
+            <a:extLst>
+              <a:ext uri="{FF2B5EF4-FFF2-40B4-BE49-F238E27FC236}">
+                <a16:creationId xmlns:a16="http://schemas.microsoft.com/office/drawing/2014/main" id="{7161D0B6-8FFB-4F12-8327-DC4C26AB6AE6}"/>
+              </a:ext>
+            </a:extLst>
+          </p:cNvPr>
+          <p:cNvGrpSpPr/>
+          <p:nvPr/>
+        </p:nvGrpSpPr>
+        <p:grpSpPr>
+          <a:xfrm>
+            <a:off x="171451" y="1328737"/>
+            <a:ext cx="645682" cy="4200526"/>
+            <a:chOff x="171451" y="1328737"/>
+            <a:chExt cx="645682" cy="4200526"/>
+          </a:xfrm>
+        </p:grpSpPr>
+        <p:sp>
+          <p:nvSpPr>
+            <p:cNvPr id="3" name="TextBox 2">
+              <a:extLst>
+                <a:ext uri="{FF2B5EF4-FFF2-40B4-BE49-F238E27FC236}">
+                  <a16:creationId xmlns:a16="http://schemas.microsoft.com/office/drawing/2014/main" id="{6E4D7D60-0018-4CA9-92C6-D8707AFDFB29}"/>
+                </a:ext>
+              </a:extLst>
+            </p:cNvPr>
+            <p:cNvSpPr txBox="1"/>
+            <p:nvPr/>
+          </p:nvSpPr>
+          <p:spPr>
+            <a:xfrm>
+              <a:off x="171451" y="1328737"/>
+              <a:ext cx="601447" cy="646331"/>
+            </a:xfrm>
+            <a:prstGeom prst="rect">
+              <a:avLst/>
+            </a:prstGeom>
+            <a:noFill/>
+          </p:spPr>
+          <p:txBody>
+            <a:bodyPr wrap="none" rtlCol="0">
+              <a:spAutoFit/>
+            </a:bodyPr>
+            <a:lstStyle/>
+            <a:p>
+              <a:r>
+                <a:rPr lang="en-GB" sz="3600" dirty="0">
+                  <a:solidFill>
+                    <a:srgbClr val="FF0000"/>
+                  </a:solidFill>
+                </a:rPr>
+                <a:t>V</a:t>
+              </a:r>
+              <a:r>
+                <a:rPr lang="en-GB" sz="3600" baseline="-25000" dirty="0">
+                  <a:solidFill>
+                    <a:srgbClr val="FF0000"/>
+                  </a:solidFill>
+                </a:rPr>
+                <a:t>0</a:t>
+              </a:r>
+            </a:p>
+          </p:txBody>
+        </p:sp>
+        <p:sp>
+          <p:nvSpPr>
+            <p:cNvPr id="4" name="TextBox 3">
+              <a:extLst>
+                <a:ext uri="{FF2B5EF4-FFF2-40B4-BE49-F238E27FC236}">
+                  <a16:creationId xmlns:a16="http://schemas.microsoft.com/office/drawing/2014/main" id="{99B42F8C-3382-46B9-A6DA-AC85A64BC10D}"/>
+                </a:ext>
+              </a:extLst>
+            </p:cNvPr>
+            <p:cNvSpPr txBox="1"/>
+            <p:nvPr/>
+          </p:nvSpPr>
+          <p:spPr>
+            <a:xfrm>
+              <a:off x="187111" y="3105834"/>
+              <a:ext cx="601447" cy="646331"/>
+            </a:xfrm>
+            <a:prstGeom prst="rect">
+              <a:avLst/>
+            </a:prstGeom>
+            <a:noFill/>
+          </p:spPr>
+          <p:txBody>
+            <a:bodyPr wrap="none" rtlCol="0">
+              <a:spAutoFit/>
+            </a:bodyPr>
+            <a:lstStyle/>
+            <a:p>
+              <a:r>
+                <a:rPr lang="en-GB" sz="3600" dirty="0">
+                  <a:solidFill>
+                    <a:schemeClr val="bg1">
+                      <a:lumMod val="85000"/>
+                    </a:schemeClr>
+                  </a:solidFill>
+                </a:rPr>
+                <a:t>V</a:t>
+              </a:r>
+              <a:r>
+                <a:rPr lang="en-GB" sz="3600" baseline="-25000" dirty="0">
+                  <a:solidFill>
+                    <a:schemeClr val="bg1">
+                      <a:lumMod val="85000"/>
+                    </a:schemeClr>
+                  </a:solidFill>
+                </a:rPr>
+                <a:t>1</a:t>
+              </a:r>
+            </a:p>
+          </p:txBody>
+        </p:sp>
+        <p:sp>
+          <p:nvSpPr>
+            <p:cNvPr id="5" name="TextBox 4">
+              <a:extLst>
+                <a:ext uri="{FF2B5EF4-FFF2-40B4-BE49-F238E27FC236}">
+                  <a16:creationId xmlns:a16="http://schemas.microsoft.com/office/drawing/2014/main" id="{5704A7A7-6B30-495C-AD45-8E05B21EA416}"/>
+                </a:ext>
+              </a:extLst>
+            </p:cNvPr>
+            <p:cNvSpPr txBox="1"/>
+            <p:nvPr/>
+          </p:nvSpPr>
+          <p:spPr>
+            <a:xfrm>
+              <a:off x="215686" y="4882932"/>
+              <a:ext cx="601447" cy="646331"/>
+            </a:xfrm>
+            <a:prstGeom prst="rect">
+              <a:avLst/>
+            </a:prstGeom>
+            <a:noFill/>
+          </p:spPr>
+          <p:txBody>
+            <a:bodyPr wrap="none" rtlCol="0">
+              <a:spAutoFit/>
+            </a:bodyPr>
+            <a:lstStyle/>
+            <a:p>
+              <a:r>
+                <a:rPr lang="en-GB" sz="3600" dirty="0">
+                  <a:solidFill>
+                    <a:schemeClr val="bg1">
+                      <a:lumMod val="85000"/>
+                    </a:schemeClr>
+                  </a:solidFill>
+                </a:rPr>
+                <a:t>V</a:t>
+              </a:r>
+              <a:r>
+                <a:rPr lang="en-GB" sz="3600" baseline="-25000" dirty="0">
+                  <a:solidFill>
+                    <a:schemeClr val="bg1">
+                      <a:lumMod val="85000"/>
+                    </a:schemeClr>
+                  </a:solidFill>
+                </a:rPr>
+                <a:t>2</a:t>
+              </a:r>
+            </a:p>
+          </p:txBody>
+        </p:sp>
+      </p:grpSp>
+      <p:grpSp>
+        <p:nvGrpSpPr>
+          <p:cNvPr id="13" name="Group 12">
+            <a:extLst>
+              <a:ext uri="{FF2B5EF4-FFF2-40B4-BE49-F238E27FC236}">
+                <a16:creationId xmlns:a16="http://schemas.microsoft.com/office/drawing/2014/main" id="{91027474-AC00-4A33-A8F1-1E77C4530785}"/>
+              </a:ext>
+            </a:extLst>
+          </p:cNvPr>
+          <p:cNvGrpSpPr/>
+          <p:nvPr/>
+        </p:nvGrpSpPr>
+        <p:grpSpPr>
+          <a:xfrm>
+            <a:off x="1395414" y="135929"/>
+            <a:ext cx="9213802" cy="672756"/>
+            <a:chOff x="1395414" y="135929"/>
+            <a:chExt cx="9213802" cy="672756"/>
+          </a:xfrm>
+        </p:grpSpPr>
+        <p:sp>
+          <p:nvSpPr>
+            <p:cNvPr id="6" name="TextBox 5">
+              <a:extLst>
+                <a:ext uri="{FF2B5EF4-FFF2-40B4-BE49-F238E27FC236}">
+                  <a16:creationId xmlns:a16="http://schemas.microsoft.com/office/drawing/2014/main" id="{7E6B55AA-4BD3-4735-9EC5-BF48C4F6ECCF}"/>
+                </a:ext>
+              </a:extLst>
+            </p:cNvPr>
+            <p:cNvSpPr txBox="1"/>
+            <p:nvPr/>
+          </p:nvSpPr>
+          <p:spPr>
+            <a:xfrm>
+              <a:off x="1395414" y="142128"/>
+              <a:ext cx="423514" cy="646331"/>
+            </a:xfrm>
+            <a:prstGeom prst="rect">
+              <a:avLst/>
+            </a:prstGeom>
+            <a:noFill/>
+          </p:spPr>
+          <p:txBody>
+            <a:bodyPr wrap="none" rtlCol="0">
+              <a:spAutoFit/>
+            </a:bodyPr>
+            <a:lstStyle/>
+            <a:p>
+              <a:r>
+                <a:rPr lang="en-GB" sz="3600" dirty="0">
+                  <a:solidFill>
+                    <a:schemeClr val="accent3">
+                      <a:lumMod val="20000"/>
+                      <a:lumOff val="80000"/>
+                    </a:schemeClr>
+                  </a:solidFill>
+                </a:rPr>
+                <a:t>X</a:t>
+              </a:r>
+              <a:endParaRPr lang="en-GB" sz="3600" baseline="-25000" dirty="0">
+                <a:solidFill>
+                  <a:schemeClr val="accent3">
+                    <a:lumMod val="20000"/>
+                    <a:lumOff val="80000"/>
+                  </a:schemeClr>
+                </a:solidFill>
+              </a:endParaRPr>
+            </a:p>
+          </p:txBody>
+        </p:sp>
+        <p:sp>
+          <p:nvSpPr>
+            <p:cNvPr id="7" name="TextBox 6">
+              <a:extLst>
+                <a:ext uri="{FF2B5EF4-FFF2-40B4-BE49-F238E27FC236}">
+                  <a16:creationId xmlns:a16="http://schemas.microsoft.com/office/drawing/2014/main" id="{B7F8DA87-164C-4C99-A855-688C4BB9CDD1}"/>
+                </a:ext>
+              </a:extLst>
+            </p:cNvPr>
+            <p:cNvSpPr txBox="1"/>
+            <p:nvPr/>
+          </p:nvSpPr>
+          <p:spPr>
+            <a:xfrm>
+              <a:off x="2819402" y="142127"/>
+              <a:ext cx="409086" cy="646331"/>
+            </a:xfrm>
+            <a:prstGeom prst="rect">
+              <a:avLst/>
+            </a:prstGeom>
+            <a:noFill/>
+          </p:spPr>
+          <p:txBody>
+            <a:bodyPr wrap="none" rtlCol="0">
+              <a:spAutoFit/>
+            </a:bodyPr>
+            <a:lstStyle/>
+            <a:p>
+              <a:r>
+                <a:rPr lang="en-GB" sz="3600" dirty="0">
+                  <a:solidFill>
+                    <a:schemeClr val="accent3">
+                      <a:lumMod val="20000"/>
+                      <a:lumOff val="80000"/>
+                    </a:schemeClr>
+                  </a:solidFill>
+                </a:rPr>
+                <a:t>Y</a:t>
+              </a:r>
+              <a:endParaRPr lang="en-GB" sz="3600" baseline="-25000" dirty="0">
+                <a:solidFill>
+                  <a:schemeClr val="accent3">
+                    <a:lumMod val="20000"/>
+                    <a:lumOff val="80000"/>
+                  </a:schemeClr>
+                </a:solidFill>
+              </a:endParaRPr>
+            </a:p>
+          </p:txBody>
+        </p:sp>
+        <p:sp>
+          <p:nvSpPr>
+            <p:cNvPr id="8" name="TextBox 7">
+              <a:extLst>
+                <a:ext uri="{FF2B5EF4-FFF2-40B4-BE49-F238E27FC236}">
+                  <a16:creationId xmlns:a16="http://schemas.microsoft.com/office/drawing/2014/main" id="{31784F42-9784-42FF-8E20-EB476085D37F}"/>
+                </a:ext>
+              </a:extLst>
+            </p:cNvPr>
+            <p:cNvSpPr txBox="1"/>
+            <p:nvPr/>
+          </p:nvSpPr>
+          <p:spPr>
+            <a:xfrm>
+              <a:off x="4228962" y="142126"/>
+              <a:ext cx="401072" cy="646331"/>
+            </a:xfrm>
+            <a:prstGeom prst="rect">
+              <a:avLst/>
+            </a:prstGeom>
+            <a:noFill/>
+          </p:spPr>
+          <p:txBody>
+            <a:bodyPr wrap="none" rtlCol="0">
+              <a:spAutoFit/>
+            </a:bodyPr>
+            <a:lstStyle/>
+            <a:p>
+              <a:r>
+                <a:rPr lang="en-GB" sz="3600" dirty="0">
+                  <a:solidFill>
+                    <a:schemeClr val="accent3">
+                      <a:lumMod val="20000"/>
+                      <a:lumOff val="80000"/>
+                    </a:schemeClr>
+                  </a:solidFill>
+                </a:rPr>
+                <a:t>Z</a:t>
+              </a:r>
+              <a:endParaRPr lang="en-GB" sz="3600" baseline="-25000" dirty="0">
+                <a:solidFill>
+                  <a:schemeClr val="accent3">
+                    <a:lumMod val="20000"/>
+                    <a:lumOff val="80000"/>
+                  </a:schemeClr>
+                </a:solidFill>
+              </a:endParaRPr>
+            </a:p>
+          </p:txBody>
+        </p:sp>
+        <p:sp>
+          <p:nvSpPr>
+            <p:cNvPr id="9" name="TextBox 8">
+              <a:extLst>
+                <a:ext uri="{FF2B5EF4-FFF2-40B4-BE49-F238E27FC236}">
+                  <a16:creationId xmlns:a16="http://schemas.microsoft.com/office/drawing/2014/main" id="{E4D8761F-2E03-4135-B53C-DA676F151D76}"/>
+                </a:ext>
+              </a:extLst>
+            </p:cNvPr>
+            <p:cNvSpPr txBox="1"/>
+            <p:nvPr/>
+          </p:nvSpPr>
+          <p:spPr>
+            <a:xfrm>
+              <a:off x="5686914" y="142126"/>
+              <a:ext cx="434734" cy="646331"/>
+            </a:xfrm>
+            <a:prstGeom prst="rect">
+              <a:avLst/>
+            </a:prstGeom>
+            <a:noFill/>
+          </p:spPr>
+          <p:txBody>
+            <a:bodyPr wrap="none" rtlCol="0">
+              <a:spAutoFit/>
+            </a:bodyPr>
+            <a:lstStyle/>
+            <a:p>
+              <a:r>
+                <a:rPr lang="en-GB" sz="3600" dirty="0">
+                  <a:solidFill>
+                    <a:schemeClr val="accent3">
+                      <a:lumMod val="20000"/>
+                      <a:lumOff val="80000"/>
+                    </a:schemeClr>
+                  </a:solidFill>
+                </a:rPr>
+                <a:t>R</a:t>
+              </a:r>
+              <a:endParaRPr lang="en-GB" sz="3600" baseline="-25000" dirty="0">
+                <a:solidFill>
+                  <a:schemeClr val="accent3">
+                    <a:lumMod val="20000"/>
+                    <a:lumOff val="80000"/>
+                  </a:schemeClr>
+                </a:solidFill>
+              </a:endParaRPr>
+            </a:p>
+          </p:txBody>
+        </p:sp>
+        <p:sp>
+          <p:nvSpPr>
+            <p:cNvPr id="10" name="TextBox 9">
+              <a:extLst>
+                <a:ext uri="{FF2B5EF4-FFF2-40B4-BE49-F238E27FC236}">
+                  <a16:creationId xmlns:a16="http://schemas.microsoft.com/office/drawing/2014/main" id="{DA43F5FC-1BF3-4438-BF09-4A712BB936CA}"/>
+                </a:ext>
+              </a:extLst>
+            </p:cNvPr>
+            <p:cNvSpPr txBox="1"/>
+            <p:nvPr/>
+          </p:nvSpPr>
+          <p:spPr>
+            <a:xfrm>
+              <a:off x="7186192" y="135929"/>
+              <a:ext cx="476412" cy="646331"/>
+            </a:xfrm>
+            <a:prstGeom prst="rect">
+              <a:avLst/>
+            </a:prstGeom>
+            <a:noFill/>
+          </p:spPr>
+          <p:txBody>
+            <a:bodyPr wrap="none" rtlCol="0">
+              <a:spAutoFit/>
+            </a:bodyPr>
+            <a:lstStyle/>
+            <a:p>
+              <a:r>
+                <a:rPr lang="en-GB" sz="3600" dirty="0">
+                  <a:solidFill>
+                    <a:schemeClr val="accent3">
+                      <a:lumMod val="20000"/>
+                      <a:lumOff val="80000"/>
+                    </a:schemeClr>
+                  </a:solidFill>
+                </a:rPr>
+                <a:t>G</a:t>
+              </a:r>
+              <a:endParaRPr lang="en-GB" sz="3600" baseline="-25000" dirty="0">
+                <a:solidFill>
+                  <a:schemeClr val="accent3">
+                    <a:lumMod val="20000"/>
+                    <a:lumOff val="80000"/>
+                  </a:schemeClr>
+                </a:solidFill>
+              </a:endParaRPr>
+            </a:p>
+          </p:txBody>
+        </p:sp>
+        <p:sp>
+          <p:nvSpPr>
+            <p:cNvPr id="11" name="TextBox 10">
+              <a:extLst>
+                <a:ext uri="{FF2B5EF4-FFF2-40B4-BE49-F238E27FC236}">
+                  <a16:creationId xmlns:a16="http://schemas.microsoft.com/office/drawing/2014/main" id="{2B4FFB84-BF75-48C6-A678-0DDE22523F4E}"/>
+                </a:ext>
+              </a:extLst>
+            </p:cNvPr>
+            <p:cNvSpPr txBox="1"/>
+            <p:nvPr/>
+          </p:nvSpPr>
+          <p:spPr>
+            <a:xfrm>
+              <a:off x="8706237" y="162354"/>
+              <a:ext cx="394900" cy="646331"/>
+            </a:xfrm>
+            <a:prstGeom prst="rect">
+              <a:avLst/>
+            </a:prstGeom>
+            <a:noFill/>
+          </p:spPr>
+          <p:txBody>
+            <a:bodyPr wrap="square" rtlCol="0">
+              <a:spAutoFit/>
+            </a:bodyPr>
+            <a:lstStyle/>
+            <a:p>
+              <a:r>
+                <a:rPr lang="en-GB" sz="3600" dirty="0">
+                  <a:solidFill>
+                    <a:schemeClr val="accent3">
+                      <a:lumMod val="20000"/>
+                      <a:lumOff val="80000"/>
+                    </a:schemeClr>
+                  </a:solidFill>
+                </a:rPr>
+                <a:t>B</a:t>
+              </a:r>
+              <a:endParaRPr lang="en-GB" sz="3600" baseline="-25000" dirty="0">
+                <a:solidFill>
+                  <a:schemeClr val="accent3">
+                    <a:lumMod val="20000"/>
+                    <a:lumOff val="80000"/>
+                  </a:schemeClr>
+                </a:solidFill>
+              </a:endParaRPr>
+            </a:p>
+          </p:txBody>
+        </p:sp>
+        <p:sp>
+          <p:nvSpPr>
+            <p:cNvPr id="12" name="TextBox 11">
+              <a:extLst>
+                <a:ext uri="{FF2B5EF4-FFF2-40B4-BE49-F238E27FC236}">
+                  <a16:creationId xmlns:a16="http://schemas.microsoft.com/office/drawing/2014/main" id="{8F1FC395-128F-411C-82F0-9FB5A8061FD1}"/>
+                </a:ext>
+              </a:extLst>
+            </p:cNvPr>
+            <p:cNvSpPr txBox="1"/>
+            <p:nvPr/>
+          </p:nvSpPr>
+          <p:spPr>
+            <a:xfrm>
+              <a:off x="10156848" y="135929"/>
+              <a:ext cx="452368" cy="646331"/>
+            </a:xfrm>
+            <a:prstGeom prst="rect">
+              <a:avLst/>
+            </a:prstGeom>
+            <a:noFill/>
+          </p:spPr>
+          <p:txBody>
+            <a:bodyPr wrap="none" rtlCol="0">
+              <a:spAutoFit/>
+            </a:bodyPr>
+            <a:lstStyle/>
+            <a:p>
+              <a:r>
+                <a:rPr lang="en-GB" sz="3600" dirty="0">
+                  <a:solidFill>
+                    <a:schemeClr val="accent3">
+                      <a:lumMod val="20000"/>
+                      <a:lumOff val="80000"/>
+                    </a:schemeClr>
+                  </a:solidFill>
+                </a:rPr>
+                <a:t>A</a:t>
+              </a:r>
+              <a:endParaRPr lang="en-GB" sz="3600" baseline="-25000" dirty="0">
+                <a:solidFill>
+                  <a:schemeClr val="accent3">
+                    <a:lumMod val="20000"/>
+                    <a:lumOff val="80000"/>
+                  </a:schemeClr>
+                </a:solidFill>
+              </a:endParaRPr>
+            </a:p>
+          </p:txBody>
+        </p:sp>
+      </p:grpSp>
+      <p:sp>
+        <p:nvSpPr>
+          <p:cNvPr id="20" name="TextBox 19">
+            <a:extLst>
+              <a:ext uri="{FF2B5EF4-FFF2-40B4-BE49-F238E27FC236}">
+                <a16:creationId xmlns:a16="http://schemas.microsoft.com/office/drawing/2014/main" id="{A19F72CE-E52E-4D32-94BA-0E5220BD2997}"/>
+              </a:ext>
+            </a:extLst>
+          </p:cNvPr>
+          <p:cNvSpPr txBox="1"/>
+          <p:nvPr/>
+        </p:nvSpPr>
+        <p:spPr>
+          <a:xfrm>
+            <a:off x="5009536" y="-48738"/>
+            <a:ext cx="2028119" cy="1015663"/>
+          </a:xfrm>
+          <a:prstGeom prst="rect">
+            <a:avLst/>
+          </a:prstGeom>
+          <a:noFill/>
+          <a:ln>
+            <a:solidFill>
+              <a:schemeClr val="bg1"/>
+            </a:solidFill>
+          </a:ln>
+        </p:spPr>
+        <p:txBody>
+          <a:bodyPr wrap="none" rtlCol="0">
+            <a:spAutoFit/>
+          </a:bodyPr>
+          <a:lstStyle/>
+          <a:p>
+            <a:r>
+              <a:rPr lang="en-GB" sz="6000" dirty="0"/>
+              <a:t>Stride</a:t>
+            </a:r>
+          </a:p>
+        </p:txBody>
+      </p:sp>
+      <p:sp>
+        <p:nvSpPr>
+          <p:cNvPr id="21" name="Arrow: Right 20">
+            <a:extLst>
+              <a:ext uri="{FF2B5EF4-FFF2-40B4-BE49-F238E27FC236}">
+                <a16:creationId xmlns:a16="http://schemas.microsoft.com/office/drawing/2014/main" id="{5FA06DC4-30B3-44BC-BDD4-939E8CCFA85A}"/>
+              </a:ext>
+            </a:extLst>
+          </p:cNvPr>
+          <p:cNvSpPr/>
+          <p:nvPr/>
+        </p:nvSpPr>
+        <p:spPr>
+          <a:xfrm>
+            <a:off x="7061385" y="248003"/>
+            <a:ext cx="4220978" cy="534257"/>
+          </a:xfrm>
+          <a:prstGeom prst="rightArrow">
+            <a:avLst/>
+          </a:prstGeom>
+        </p:spPr>
+        <p:style>
+          <a:lnRef idx="2">
+            <a:schemeClr val="accent1">
+              <a:shade val="50000"/>
+            </a:schemeClr>
+          </a:lnRef>
+          <a:fillRef idx="1">
+            <a:schemeClr val="accent1"/>
+          </a:fillRef>
+          <a:effectRef idx="0">
+            <a:schemeClr val="accent1"/>
+          </a:effectRef>
+          <a:fontRef idx="minor">
+            <a:schemeClr val="lt1"/>
+          </a:fontRef>
+        </p:style>
+        <p:txBody>
+          <a:bodyPr rtlCol="0" anchor="ctr"/>
+          <a:lstStyle/>
+          <a:p>
+            <a:pPr algn="ctr"/>
+            <a:endParaRPr lang="en-GB"/>
+          </a:p>
+        </p:txBody>
+      </p:sp>
+      <p:sp>
+        <p:nvSpPr>
+          <p:cNvPr id="22" name="Arrow: Right 21">
+            <a:extLst>
+              <a:ext uri="{FF2B5EF4-FFF2-40B4-BE49-F238E27FC236}">
+                <a16:creationId xmlns:a16="http://schemas.microsoft.com/office/drawing/2014/main" id="{2C4F878B-D56E-48C5-80F3-3E8569CC9D87}"/>
+              </a:ext>
+            </a:extLst>
+          </p:cNvPr>
+          <p:cNvSpPr/>
+          <p:nvPr/>
+        </p:nvSpPr>
+        <p:spPr>
+          <a:xfrm rot="10800000">
+            <a:off x="909637" y="218389"/>
+            <a:ext cx="4020254" cy="534257"/>
+          </a:xfrm>
+          <a:prstGeom prst="rightArrow">
+            <a:avLst/>
+          </a:prstGeom>
+        </p:spPr>
+        <p:style>
+          <a:lnRef idx="2">
+            <a:schemeClr val="accent1">
+              <a:shade val="50000"/>
+            </a:schemeClr>
+          </a:lnRef>
+          <a:fillRef idx="1">
+            <a:schemeClr val="accent1"/>
+          </a:fillRef>
+          <a:effectRef idx="0">
+            <a:schemeClr val="accent1"/>
+          </a:effectRef>
+          <a:fontRef idx="minor">
+            <a:schemeClr val="lt1"/>
+          </a:fontRef>
+        </p:style>
+        <p:txBody>
+          <a:bodyPr rtlCol="0" anchor="ctr"/>
+          <a:lstStyle/>
+          <a:p>
+            <a:pPr algn="ctr"/>
+            <a:endParaRPr lang="en-GB"/>
+          </a:p>
+        </p:txBody>
+      </p:sp>
+    </p:spTree>
+    <p:extLst>
+      <p:ext uri="{BB962C8B-B14F-4D97-AF65-F5344CB8AC3E}">
+        <p14:creationId xmlns:p14="http://schemas.microsoft.com/office/powerpoint/2010/main" val="4204120396"/>
+      </p:ext>
+    </p:extLst>
+  </p:cSld>
+  <p:clrMapOvr>
+    <a:masterClrMapping/>
+  </p:clrMapOvr>
+</p:sld>
+</file>
+
+<file path=ppt/slides/slide5.xml><?xml version="1.0" encoding="utf-8"?>
+<p:sld xmlns:a="http://schemas.openxmlformats.org/drawingml/2006/main" xmlns:r="http://schemas.openxmlformats.org/officeDocument/2006/relationships" xmlns:p="http://schemas.openxmlformats.org/presentationml/2006/main">
+  <p:cSld>
+    <p:spTree>
+      <p:nvGrpSpPr>
+        <p:cNvPr id="1" name=""/>
+        <p:cNvGrpSpPr/>
+        <p:nvPr/>
+      </p:nvGrpSpPr>
+      <p:grpSpPr>
+        <a:xfrm>
+          <a:off x="0" y="0"/>
+          <a:ext cx="0" cy="0"/>
+          <a:chOff x="0" y="0"/>
+          <a:chExt cx="0" cy="0"/>
+        </a:xfrm>
+      </p:grpSpPr>
+      <p:graphicFrame>
+        <p:nvGraphicFramePr>
+          <p:cNvPr id="2" name="Table 1">
+            <a:extLst>
+              <a:ext uri="{FF2B5EF4-FFF2-40B4-BE49-F238E27FC236}">
+                <a16:creationId xmlns:a16="http://schemas.microsoft.com/office/drawing/2014/main" id="{AD96BCE0-8DCA-4093-A3BE-26CBFA29C773}"/>
+              </a:ext>
+            </a:extLst>
+          </p:cNvPr>
+          <p:cNvGraphicFramePr>
+            <a:graphicFrameLocks noGrp="1"/>
+          </p:cNvGraphicFramePr>
+          <p:nvPr>
+            <p:extLst>
+              <p:ext uri="{D42A27DB-BD31-4B8C-83A1-F6EECF244321}">
+                <p14:modId xmlns:p14="http://schemas.microsoft.com/office/powerpoint/2010/main" val="2787208449"/>
+              </p:ext>
+            </p:extLst>
+          </p:nvPr>
+        </p:nvGraphicFramePr>
+        <p:xfrm>
+          <a:off x="909637" y="917046"/>
+          <a:ext cx="10372726" cy="5023908"/>
+        </p:xfrm>
+        <a:graphic>
+          <a:graphicData uri="http://schemas.openxmlformats.org/drawingml/2006/table">
+            <a:tbl>
+              <a:tblPr firstRow="1" bandRow="1">
+                <a:tableStyleId>{5940675A-B579-460E-94D1-54222C63F5DA}</a:tableStyleId>
+              </a:tblPr>
+              <a:tblGrid>
+                <a:gridCol w="1481818">
+                  <a:extLst>
+                    <a:ext uri="{9D8B030D-6E8A-4147-A177-3AD203B41FA5}">
+                      <a16:colId xmlns:a16="http://schemas.microsoft.com/office/drawing/2014/main" val="3582919249"/>
+                    </a:ext>
+                  </a:extLst>
+                </a:gridCol>
+                <a:gridCol w="1481818">
+                  <a:extLst>
+                    <a:ext uri="{9D8B030D-6E8A-4147-A177-3AD203B41FA5}">
+                      <a16:colId xmlns:a16="http://schemas.microsoft.com/office/drawing/2014/main" val="3770908203"/>
+                    </a:ext>
+                  </a:extLst>
+                </a:gridCol>
+                <a:gridCol w="1481818">
+                  <a:extLst>
+                    <a:ext uri="{9D8B030D-6E8A-4147-A177-3AD203B41FA5}">
+                      <a16:colId xmlns:a16="http://schemas.microsoft.com/office/drawing/2014/main" val="1708705948"/>
+                    </a:ext>
+                  </a:extLst>
+                </a:gridCol>
+                <a:gridCol w="1481818">
+                  <a:extLst>
+                    <a:ext uri="{9D8B030D-6E8A-4147-A177-3AD203B41FA5}">
+                      <a16:colId xmlns:a16="http://schemas.microsoft.com/office/drawing/2014/main" val="555709313"/>
+                    </a:ext>
+                  </a:extLst>
+                </a:gridCol>
+                <a:gridCol w="1481818">
+                  <a:extLst>
+                    <a:ext uri="{9D8B030D-6E8A-4147-A177-3AD203B41FA5}">
+                      <a16:colId xmlns:a16="http://schemas.microsoft.com/office/drawing/2014/main" val="276516747"/>
+                    </a:ext>
+                  </a:extLst>
+                </a:gridCol>
+                <a:gridCol w="1481818">
+                  <a:extLst>
+                    <a:ext uri="{9D8B030D-6E8A-4147-A177-3AD203B41FA5}">
+                      <a16:colId xmlns:a16="http://schemas.microsoft.com/office/drawing/2014/main" val="2355060899"/>
+                    </a:ext>
+                  </a:extLst>
+                </a:gridCol>
+                <a:gridCol w="1481818">
+                  <a:extLst>
+                    <a:ext uri="{9D8B030D-6E8A-4147-A177-3AD203B41FA5}">
+                      <a16:colId xmlns:a16="http://schemas.microsoft.com/office/drawing/2014/main" val="2526681808"/>
+                    </a:ext>
+                  </a:extLst>
+                </a:gridCol>
+              </a:tblGrid>
+              <a:tr h="1674636">
+                <a:tc>
+                  <a:txBody>
+                    <a:bodyPr/>
+                    <a:lstStyle/>
+                    <a:p>
+                      <a:pPr algn="ctr"/>
+                      <a:r>
+                        <a:rPr lang="en-GB" sz="4800" dirty="0">
+                          <a:solidFill>
+                            <a:schemeClr val="bg1">
+                              <a:lumMod val="85000"/>
+                            </a:schemeClr>
+                          </a:solidFill>
+                        </a:rPr>
+                        <a:t>-0.5</a:t>
+                      </a:r>
+                    </a:p>
+                  </a:txBody>
+                  <a:tcPr anchor="ctr"/>
+                </a:tc>
+                <a:tc>
+                  <a:txBody>
+                    <a:bodyPr/>
+                    <a:lstStyle/>
+                    <a:p>
+                      <a:pPr algn="ctr"/>
+                      <a:r>
+                        <a:rPr lang="en-GB" sz="4800" dirty="0">
+                          <a:solidFill>
+                            <a:schemeClr val="bg1">
+                              <a:lumMod val="85000"/>
+                            </a:schemeClr>
+                          </a:solidFill>
+                        </a:rPr>
+                        <a:t>-0.5</a:t>
+                      </a:r>
+                    </a:p>
+                  </a:txBody>
+                  <a:tcPr anchor="ctr"/>
+                </a:tc>
+                <a:tc>
+                  <a:txBody>
+                    <a:bodyPr/>
+                    <a:lstStyle/>
+                    <a:p>
+                      <a:pPr algn="ctr"/>
+                      <a:r>
+                        <a:rPr lang="en-GB" sz="4800" dirty="0">
+                          <a:solidFill>
+                            <a:schemeClr val="bg1">
+                              <a:lumMod val="85000"/>
+                            </a:schemeClr>
+                          </a:solidFill>
+                        </a:rPr>
+                        <a:t>0.0</a:t>
+                      </a:r>
+                    </a:p>
+                  </a:txBody>
+                  <a:tcPr anchor="ctr"/>
+                </a:tc>
+                <a:tc>
+                  <a:txBody>
+                    <a:bodyPr/>
+                    <a:lstStyle/>
+                    <a:p>
+                      <a:pPr algn="ctr"/>
+                      <a:r>
+                        <a:rPr lang="en-GB" sz="4800" dirty="0"/>
+                        <a:t>1.0</a:t>
+                      </a:r>
+                    </a:p>
+                  </a:txBody>
+                  <a:tcPr anchor="ctr"/>
+                </a:tc>
+                <a:tc>
+                  <a:txBody>
+                    <a:bodyPr/>
+                    <a:lstStyle/>
+                    <a:p>
+                      <a:pPr algn="ctr"/>
+                      <a:r>
+                        <a:rPr lang="en-GB" sz="4800" dirty="0"/>
+                        <a:t>0.0</a:t>
+                      </a:r>
+                    </a:p>
+                  </a:txBody>
+                  <a:tcPr anchor="ctr"/>
+                </a:tc>
+                <a:tc>
+                  <a:txBody>
+                    <a:bodyPr/>
+                    <a:lstStyle/>
+                    <a:p>
+                      <a:pPr algn="ctr"/>
+                      <a:r>
+                        <a:rPr lang="en-GB" sz="4800" dirty="0"/>
+                        <a:t>0.0</a:t>
+                      </a:r>
+                    </a:p>
+                  </a:txBody>
+                  <a:tcPr anchor="ctr"/>
+                </a:tc>
+                <a:tc>
+                  <a:txBody>
+                    <a:bodyPr/>
+                    <a:lstStyle/>
+                    <a:p>
+                      <a:pPr algn="ctr"/>
+                      <a:r>
+                        <a:rPr lang="en-GB" sz="4800" dirty="0"/>
+                        <a:t>1.0</a:t>
+                      </a:r>
+                    </a:p>
+                  </a:txBody>
+                  <a:tcPr anchor="ctr"/>
+                </a:tc>
+                <a:extLst>
+                  <a:ext uri="{0D108BD9-81ED-4DB2-BD59-A6C34878D82A}">
+                    <a16:rowId xmlns:a16="http://schemas.microsoft.com/office/drawing/2014/main" val="1076018968"/>
+                  </a:ext>
+                </a:extLst>
+              </a:tr>
+              <a:tr h="1674636">
+                <a:tc>
+                  <a:txBody>
+                    <a:bodyPr/>
+                    <a:lstStyle/>
+                    <a:p>
+                      <a:pPr algn="ctr"/>
+                      <a:r>
+                        <a:rPr lang="en-GB" sz="4800" dirty="0">
+                          <a:solidFill>
+                            <a:schemeClr val="bg1">
+                              <a:lumMod val="85000"/>
+                            </a:schemeClr>
+                          </a:solidFill>
+                        </a:rPr>
+                        <a:t>0.5</a:t>
+                      </a:r>
+                    </a:p>
+                  </a:txBody>
+                  <a:tcPr anchor="ctr"/>
+                </a:tc>
+                <a:tc>
+                  <a:txBody>
+                    <a:bodyPr/>
+                    <a:lstStyle/>
+                    <a:p>
+                      <a:pPr algn="ctr"/>
+                      <a:r>
+                        <a:rPr lang="en-GB" sz="4800" dirty="0">
+                          <a:solidFill>
+                            <a:schemeClr val="bg1">
+                              <a:lumMod val="85000"/>
+                            </a:schemeClr>
+                          </a:solidFill>
+                        </a:rPr>
+                        <a:t>-0.5</a:t>
+                      </a:r>
+                    </a:p>
+                  </a:txBody>
+                  <a:tcPr anchor="ctr"/>
+                </a:tc>
+                <a:tc>
+                  <a:txBody>
+                    <a:bodyPr/>
+                    <a:lstStyle/>
+                    <a:p>
+                      <a:pPr algn="ctr"/>
+                      <a:r>
+                        <a:rPr lang="en-GB" sz="4800" dirty="0">
+                          <a:solidFill>
+                            <a:schemeClr val="bg1">
+                              <a:lumMod val="85000"/>
+                            </a:schemeClr>
+                          </a:solidFill>
+                        </a:rPr>
+                        <a:t>0.0</a:t>
+                      </a:r>
+                    </a:p>
+                  </a:txBody>
+                  <a:tcPr anchor="ctr"/>
+                </a:tc>
+                <a:tc>
+                  <a:txBody>
+                    <a:bodyPr/>
+                    <a:lstStyle/>
+                    <a:p>
+                      <a:pPr algn="ctr"/>
+                      <a:r>
+                        <a:rPr lang="en-GB" sz="4800" dirty="0">
+                          <a:solidFill>
+                            <a:schemeClr val="bg1">
+                              <a:lumMod val="85000"/>
+                            </a:schemeClr>
+                          </a:solidFill>
+                        </a:rPr>
+                        <a:t>0.0</a:t>
+                      </a:r>
+                    </a:p>
+                  </a:txBody>
+                  <a:tcPr anchor="ctr"/>
+                </a:tc>
+                <a:tc>
+                  <a:txBody>
+                    <a:bodyPr/>
+                    <a:lstStyle/>
+                    <a:p>
+                      <a:pPr algn="ctr"/>
+                      <a:r>
+                        <a:rPr lang="en-GB" sz="4800" dirty="0">
+                          <a:solidFill>
+                            <a:schemeClr val="bg1">
+                              <a:lumMod val="85000"/>
+                            </a:schemeClr>
+                          </a:solidFill>
+                        </a:rPr>
+                        <a:t>1.1</a:t>
+                      </a:r>
+                    </a:p>
+                  </a:txBody>
+                  <a:tcPr anchor="ctr"/>
+                </a:tc>
+                <a:tc>
+                  <a:txBody>
+                    <a:bodyPr/>
+                    <a:lstStyle/>
+                    <a:p>
+                      <a:pPr algn="ctr"/>
+                      <a:r>
+                        <a:rPr lang="en-GB" sz="4800" dirty="0">
+                          <a:solidFill>
+                            <a:schemeClr val="bg1">
+                              <a:lumMod val="85000"/>
+                            </a:schemeClr>
+                          </a:solidFill>
+                        </a:rPr>
+                        <a:t>0.0</a:t>
+                      </a:r>
+                    </a:p>
+                  </a:txBody>
+                  <a:tcPr anchor="ctr"/>
+                </a:tc>
+                <a:tc>
+                  <a:txBody>
+                    <a:bodyPr/>
+                    <a:lstStyle/>
+                    <a:p>
+                      <a:pPr algn="ctr"/>
+                      <a:r>
+                        <a:rPr lang="en-GB" sz="4800" dirty="0">
+                          <a:solidFill>
+                            <a:schemeClr val="bg1">
+                              <a:lumMod val="85000"/>
+                            </a:schemeClr>
+                          </a:solidFill>
+                        </a:rPr>
+                        <a:t>1.0</a:t>
+                      </a:r>
+                    </a:p>
+                  </a:txBody>
+                  <a:tcPr anchor="ctr"/>
+                </a:tc>
+                <a:extLst>
+                  <a:ext uri="{0D108BD9-81ED-4DB2-BD59-A6C34878D82A}">
+                    <a16:rowId xmlns:a16="http://schemas.microsoft.com/office/drawing/2014/main" val="1901692041"/>
+                  </a:ext>
+                </a:extLst>
+              </a:tr>
+              <a:tr h="1674636">
+                <a:tc>
+                  <a:txBody>
+                    <a:bodyPr/>
+                    <a:lstStyle/>
+                    <a:p>
+                      <a:pPr algn="ctr"/>
+                      <a:r>
+                        <a:rPr lang="en-GB" sz="4800" dirty="0">
+                          <a:solidFill>
+                            <a:schemeClr val="bg1">
+                              <a:lumMod val="85000"/>
+                            </a:schemeClr>
+                          </a:solidFill>
+                        </a:rPr>
+                        <a:t>0.0</a:t>
+                      </a:r>
+                    </a:p>
+                  </a:txBody>
+                  <a:tcPr anchor="ctr"/>
+                </a:tc>
+                <a:tc>
+                  <a:txBody>
+                    <a:bodyPr/>
+                    <a:lstStyle/>
+                    <a:p>
+                      <a:pPr algn="ctr"/>
+                      <a:r>
+                        <a:rPr lang="en-GB" sz="4800" dirty="0">
+                          <a:solidFill>
+                            <a:schemeClr val="bg1">
+                              <a:lumMod val="85000"/>
+                            </a:schemeClr>
+                          </a:solidFill>
+                        </a:rPr>
+                        <a:t>0.2</a:t>
+                      </a:r>
+                    </a:p>
+                  </a:txBody>
+                  <a:tcPr anchor="ctr"/>
+                </a:tc>
+                <a:tc>
+                  <a:txBody>
+                    <a:bodyPr/>
+                    <a:lstStyle/>
+                    <a:p>
+                      <a:pPr algn="ctr"/>
+                      <a:r>
+                        <a:rPr lang="en-GB" sz="4800" dirty="0">
+                          <a:solidFill>
+                            <a:schemeClr val="bg1">
+                              <a:lumMod val="85000"/>
+                            </a:schemeClr>
+                          </a:solidFill>
+                        </a:rPr>
+                        <a:t>0.0</a:t>
+                      </a:r>
+                    </a:p>
+                  </a:txBody>
+                  <a:tcPr anchor="ctr"/>
+                </a:tc>
+                <a:tc>
+                  <a:txBody>
+                    <a:bodyPr/>
+                    <a:lstStyle/>
+                    <a:p>
+                      <a:pPr algn="ctr"/>
+                      <a:r>
+                        <a:rPr lang="en-GB" sz="4800" dirty="0">
+                          <a:solidFill>
+                            <a:schemeClr val="bg1">
+                              <a:lumMod val="85000"/>
+                            </a:schemeClr>
+                          </a:solidFill>
+                        </a:rPr>
+                        <a:t>0.0</a:t>
+                      </a:r>
+                    </a:p>
+                  </a:txBody>
+                  <a:tcPr anchor="ctr"/>
+                </a:tc>
+                <a:tc>
+                  <a:txBody>
+                    <a:bodyPr/>
+                    <a:lstStyle/>
+                    <a:p>
+                      <a:pPr algn="ctr"/>
+                      <a:r>
+                        <a:rPr lang="en-GB" sz="4800" dirty="0">
+                          <a:solidFill>
+                            <a:schemeClr val="bg1">
+                              <a:lumMod val="85000"/>
+                            </a:schemeClr>
+                          </a:solidFill>
+                        </a:rPr>
+                        <a:t>0.0</a:t>
+                      </a:r>
+                    </a:p>
+                  </a:txBody>
+                  <a:tcPr anchor="ctr"/>
+                </a:tc>
+                <a:tc>
+                  <a:txBody>
+                    <a:bodyPr/>
+                    <a:lstStyle/>
+                    <a:p>
+                      <a:pPr algn="ctr"/>
+                      <a:r>
+                        <a:rPr lang="en-GB" sz="4800" dirty="0">
+                          <a:solidFill>
+                            <a:schemeClr val="bg1">
+                              <a:lumMod val="85000"/>
+                            </a:schemeClr>
+                          </a:solidFill>
+                        </a:rPr>
+                        <a:t>1.0</a:t>
+                      </a:r>
+                    </a:p>
+                  </a:txBody>
+                  <a:tcPr anchor="ctr"/>
+                </a:tc>
+                <a:tc>
+                  <a:txBody>
+                    <a:bodyPr/>
+                    <a:lstStyle/>
+                    <a:p>
+                      <a:pPr algn="ctr"/>
+                      <a:r>
+                        <a:rPr lang="en-GB" sz="4800" dirty="0">
+                          <a:solidFill>
+                            <a:schemeClr val="bg1">
+                              <a:lumMod val="85000"/>
+                            </a:schemeClr>
+                          </a:solidFill>
+                        </a:rPr>
+                        <a:t>1.0</a:t>
+                      </a:r>
+                    </a:p>
+                  </a:txBody>
+                  <a:tcPr anchor="ctr"/>
+                </a:tc>
+                <a:extLst>
+                  <a:ext uri="{0D108BD9-81ED-4DB2-BD59-A6C34878D82A}">
+                    <a16:rowId xmlns:a16="http://schemas.microsoft.com/office/drawing/2014/main" val="1696806090"/>
+                  </a:ext>
+                </a:extLst>
+              </a:tr>
+            </a:tbl>
+          </a:graphicData>
+        </a:graphic>
+      </p:graphicFrame>
+      <p:grpSp>
+        <p:nvGrpSpPr>
+          <p:cNvPr id="14" name="Group 13">
+            <a:extLst>
+              <a:ext uri="{FF2B5EF4-FFF2-40B4-BE49-F238E27FC236}">
+                <a16:creationId xmlns:a16="http://schemas.microsoft.com/office/drawing/2014/main" id="{7161D0B6-8FFB-4F12-8327-DC4C26AB6AE6}"/>
+              </a:ext>
+            </a:extLst>
+          </p:cNvPr>
+          <p:cNvGrpSpPr/>
+          <p:nvPr/>
+        </p:nvGrpSpPr>
+        <p:grpSpPr>
+          <a:xfrm>
+            <a:off x="171451" y="1328737"/>
+            <a:ext cx="645682" cy="4200526"/>
+            <a:chOff x="171451" y="1328737"/>
+            <a:chExt cx="645682" cy="4200526"/>
+          </a:xfrm>
+        </p:grpSpPr>
+        <p:sp>
+          <p:nvSpPr>
+            <p:cNvPr id="3" name="TextBox 2">
+              <a:extLst>
+                <a:ext uri="{FF2B5EF4-FFF2-40B4-BE49-F238E27FC236}">
+                  <a16:creationId xmlns:a16="http://schemas.microsoft.com/office/drawing/2014/main" id="{6E4D7D60-0018-4CA9-92C6-D8707AFDFB29}"/>
+                </a:ext>
+              </a:extLst>
+            </p:cNvPr>
+            <p:cNvSpPr txBox="1"/>
+            <p:nvPr/>
+          </p:nvSpPr>
+          <p:spPr>
+            <a:xfrm>
+              <a:off x="171451" y="1328737"/>
+              <a:ext cx="601447" cy="646331"/>
+            </a:xfrm>
+            <a:prstGeom prst="rect">
+              <a:avLst/>
+            </a:prstGeom>
+            <a:noFill/>
+          </p:spPr>
+          <p:txBody>
+            <a:bodyPr wrap="none" rtlCol="0">
+              <a:spAutoFit/>
+            </a:bodyPr>
+            <a:lstStyle/>
+            <a:p>
+              <a:r>
+                <a:rPr lang="en-GB" sz="3600" dirty="0">
+                  <a:solidFill>
+                    <a:srgbClr val="FF0000"/>
+                  </a:solidFill>
+                </a:rPr>
+                <a:t>V</a:t>
+              </a:r>
+              <a:r>
+                <a:rPr lang="en-GB" sz="3600" baseline="-25000" dirty="0">
+                  <a:solidFill>
+                    <a:srgbClr val="FF0000"/>
+                  </a:solidFill>
+                </a:rPr>
+                <a:t>0</a:t>
+              </a:r>
+            </a:p>
+          </p:txBody>
+        </p:sp>
+        <p:sp>
+          <p:nvSpPr>
+            <p:cNvPr id="4" name="TextBox 3">
+              <a:extLst>
+                <a:ext uri="{FF2B5EF4-FFF2-40B4-BE49-F238E27FC236}">
+                  <a16:creationId xmlns:a16="http://schemas.microsoft.com/office/drawing/2014/main" id="{99B42F8C-3382-46B9-A6DA-AC85A64BC10D}"/>
+                </a:ext>
+              </a:extLst>
+            </p:cNvPr>
+            <p:cNvSpPr txBox="1"/>
+            <p:nvPr/>
+          </p:nvSpPr>
+          <p:spPr>
+            <a:xfrm>
+              <a:off x="187111" y="3105834"/>
+              <a:ext cx="601447" cy="646331"/>
+            </a:xfrm>
+            <a:prstGeom prst="rect">
+              <a:avLst/>
+            </a:prstGeom>
+            <a:noFill/>
+          </p:spPr>
+          <p:txBody>
+            <a:bodyPr wrap="none" rtlCol="0">
+              <a:spAutoFit/>
+            </a:bodyPr>
+            <a:lstStyle/>
+            <a:p>
+              <a:r>
+                <a:rPr lang="en-GB" sz="3600" dirty="0">
+                  <a:solidFill>
+                    <a:schemeClr val="bg1">
+                      <a:lumMod val="85000"/>
+                    </a:schemeClr>
+                  </a:solidFill>
+                </a:rPr>
+                <a:t>V</a:t>
+              </a:r>
+              <a:r>
+                <a:rPr lang="en-GB" sz="3600" baseline="-25000" dirty="0">
+                  <a:solidFill>
+                    <a:schemeClr val="bg1">
+                      <a:lumMod val="85000"/>
+                    </a:schemeClr>
+                  </a:solidFill>
+                </a:rPr>
+                <a:t>1</a:t>
+              </a:r>
+            </a:p>
+          </p:txBody>
+        </p:sp>
+        <p:sp>
+          <p:nvSpPr>
+            <p:cNvPr id="5" name="TextBox 4">
+              <a:extLst>
+                <a:ext uri="{FF2B5EF4-FFF2-40B4-BE49-F238E27FC236}">
+                  <a16:creationId xmlns:a16="http://schemas.microsoft.com/office/drawing/2014/main" id="{5704A7A7-6B30-495C-AD45-8E05B21EA416}"/>
+                </a:ext>
+              </a:extLst>
+            </p:cNvPr>
+            <p:cNvSpPr txBox="1"/>
+            <p:nvPr/>
+          </p:nvSpPr>
+          <p:spPr>
+            <a:xfrm>
+              <a:off x="215686" y="4882932"/>
+              <a:ext cx="601447" cy="646331"/>
+            </a:xfrm>
+            <a:prstGeom prst="rect">
+              <a:avLst/>
+            </a:prstGeom>
+            <a:noFill/>
+          </p:spPr>
+          <p:txBody>
+            <a:bodyPr wrap="none" rtlCol="0">
+              <a:spAutoFit/>
+            </a:bodyPr>
+            <a:lstStyle/>
+            <a:p>
+              <a:r>
+                <a:rPr lang="en-GB" sz="3600" dirty="0">
+                  <a:solidFill>
+                    <a:schemeClr val="bg1">
+                      <a:lumMod val="85000"/>
+                    </a:schemeClr>
+                  </a:solidFill>
+                </a:rPr>
+                <a:t>V</a:t>
+              </a:r>
+              <a:r>
+                <a:rPr lang="en-GB" sz="3600" baseline="-25000" dirty="0">
+                  <a:solidFill>
+                    <a:schemeClr val="bg1">
+                      <a:lumMod val="85000"/>
+                    </a:schemeClr>
+                  </a:solidFill>
+                </a:rPr>
+                <a:t>2</a:t>
+              </a:r>
+            </a:p>
+          </p:txBody>
+        </p:sp>
+      </p:grpSp>
+      <p:grpSp>
+        <p:nvGrpSpPr>
+          <p:cNvPr id="13" name="Group 12">
+            <a:extLst>
+              <a:ext uri="{FF2B5EF4-FFF2-40B4-BE49-F238E27FC236}">
+                <a16:creationId xmlns:a16="http://schemas.microsoft.com/office/drawing/2014/main" id="{91027474-AC00-4A33-A8F1-1E77C4530785}"/>
+              </a:ext>
+            </a:extLst>
+          </p:cNvPr>
+          <p:cNvGrpSpPr/>
+          <p:nvPr/>
+        </p:nvGrpSpPr>
+        <p:grpSpPr>
+          <a:xfrm>
+            <a:off x="1395414" y="135929"/>
+            <a:ext cx="9213802" cy="672756"/>
+            <a:chOff x="1395414" y="135929"/>
+            <a:chExt cx="9213802" cy="672756"/>
+          </a:xfrm>
+        </p:grpSpPr>
+        <p:sp>
+          <p:nvSpPr>
+            <p:cNvPr id="6" name="TextBox 5">
+              <a:extLst>
+                <a:ext uri="{FF2B5EF4-FFF2-40B4-BE49-F238E27FC236}">
+                  <a16:creationId xmlns:a16="http://schemas.microsoft.com/office/drawing/2014/main" id="{7E6B55AA-4BD3-4735-9EC5-BF48C4F6ECCF}"/>
+                </a:ext>
+              </a:extLst>
+            </p:cNvPr>
+            <p:cNvSpPr txBox="1"/>
+            <p:nvPr/>
+          </p:nvSpPr>
+          <p:spPr>
+            <a:xfrm>
+              <a:off x="1395414" y="142128"/>
+              <a:ext cx="423514" cy="646331"/>
+            </a:xfrm>
+            <a:prstGeom prst="rect">
+              <a:avLst/>
+            </a:prstGeom>
+            <a:noFill/>
+          </p:spPr>
+          <p:txBody>
+            <a:bodyPr wrap="none" rtlCol="0">
+              <a:spAutoFit/>
+            </a:bodyPr>
+            <a:lstStyle/>
+            <a:p>
+              <a:r>
+                <a:rPr lang="en-GB" sz="3600" dirty="0">
+                  <a:solidFill>
+                    <a:schemeClr val="accent3">
+                      <a:lumMod val="20000"/>
+                      <a:lumOff val="80000"/>
+                    </a:schemeClr>
+                  </a:solidFill>
+                </a:rPr>
+                <a:t>X</a:t>
+              </a:r>
+              <a:endParaRPr lang="en-GB" sz="3600" baseline="-25000" dirty="0">
+                <a:solidFill>
+                  <a:schemeClr val="accent3">
+                    <a:lumMod val="20000"/>
+                    <a:lumOff val="80000"/>
+                  </a:schemeClr>
+                </a:solidFill>
+              </a:endParaRPr>
+            </a:p>
+          </p:txBody>
+        </p:sp>
+        <p:sp>
+          <p:nvSpPr>
+            <p:cNvPr id="7" name="TextBox 6">
+              <a:extLst>
+                <a:ext uri="{FF2B5EF4-FFF2-40B4-BE49-F238E27FC236}">
+                  <a16:creationId xmlns:a16="http://schemas.microsoft.com/office/drawing/2014/main" id="{B7F8DA87-164C-4C99-A855-688C4BB9CDD1}"/>
+                </a:ext>
+              </a:extLst>
+            </p:cNvPr>
+            <p:cNvSpPr txBox="1"/>
+            <p:nvPr/>
+          </p:nvSpPr>
+          <p:spPr>
+            <a:xfrm>
+              <a:off x="2819402" y="142127"/>
+              <a:ext cx="409086" cy="646331"/>
+            </a:xfrm>
+            <a:prstGeom prst="rect">
+              <a:avLst/>
+            </a:prstGeom>
+            <a:noFill/>
+          </p:spPr>
+          <p:txBody>
+            <a:bodyPr wrap="none" rtlCol="0">
+              <a:spAutoFit/>
+            </a:bodyPr>
+            <a:lstStyle/>
+            <a:p>
+              <a:r>
+                <a:rPr lang="en-GB" sz="3600" dirty="0">
+                  <a:solidFill>
+                    <a:schemeClr val="accent3">
+                      <a:lumMod val="20000"/>
+                      <a:lumOff val="80000"/>
+                    </a:schemeClr>
+                  </a:solidFill>
+                </a:rPr>
+                <a:t>Y</a:t>
+              </a:r>
+              <a:endParaRPr lang="en-GB" sz="3600" baseline="-25000" dirty="0">
+                <a:solidFill>
+                  <a:schemeClr val="accent3">
+                    <a:lumMod val="20000"/>
+                    <a:lumOff val="80000"/>
+                  </a:schemeClr>
+                </a:solidFill>
+              </a:endParaRPr>
+            </a:p>
+          </p:txBody>
+        </p:sp>
+        <p:sp>
+          <p:nvSpPr>
+            <p:cNvPr id="8" name="TextBox 7">
+              <a:extLst>
+                <a:ext uri="{FF2B5EF4-FFF2-40B4-BE49-F238E27FC236}">
+                  <a16:creationId xmlns:a16="http://schemas.microsoft.com/office/drawing/2014/main" id="{31784F42-9784-42FF-8E20-EB476085D37F}"/>
+                </a:ext>
+              </a:extLst>
+            </p:cNvPr>
+            <p:cNvSpPr txBox="1"/>
+            <p:nvPr/>
+          </p:nvSpPr>
+          <p:spPr>
+            <a:xfrm>
+              <a:off x="4228962" y="142126"/>
+              <a:ext cx="401072" cy="646331"/>
+            </a:xfrm>
+            <a:prstGeom prst="rect">
+              <a:avLst/>
+            </a:prstGeom>
+            <a:noFill/>
+          </p:spPr>
+          <p:txBody>
+            <a:bodyPr wrap="none" rtlCol="0">
+              <a:spAutoFit/>
+            </a:bodyPr>
+            <a:lstStyle/>
+            <a:p>
+              <a:r>
+                <a:rPr lang="en-GB" sz="3600" dirty="0">
+                  <a:solidFill>
+                    <a:schemeClr val="accent3">
+                      <a:lumMod val="20000"/>
+                      <a:lumOff val="80000"/>
+                    </a:schemeClr>
+                  </a:solidFill>
+                </a:rPr>
+                <a:t>Z</a:t>
+              </a:r>
+              <a:endParaRPr lang="en-GB" sz="3600" baseline="-25000" dirty="0">
+                <a:solidFill>
+                  <a:schemeClr val="accent3">
+                    <a:lumMod val="20000"/>
+                    <a:lumOff val="80000"/>
+                  </a:schemeClr>
+                </a:solidFill>
+              </a:endParaRPr>
+            </a:p>
+          </p:txBody>
+        </p:sp>
+        <p:sp>
+          <p:nvSpPr>
+            <p:cNvPr id="9" name="TextBox 8">
+              <a:extLst>
+                <a:ext uri="{FF2B5EF4-FFF2-40B4-BE49-F238E27FC236}">
+                  <a16:creationId xmlns:a16="http://schemas.microsoft.com/office/drawing/2014/main" id="{E4D8761F-2E03-4135-B53C-DA676F151D76}"/>
+                </a:ext>
+              </a:extLst>
+            </p:cNvPr>
+            <p:cNvSpPr txBox="1"/>
+            <p:nvPr/>
+          </p:nvSpPr>
+          <p:spPr>
+            <a:xfrm>
+              <a:off x="5686914" y="142126"/>
+              <a:ext cx="434734" cy="646331"/>
+            </a:xfrm>
+            <a:prstGeom prst="rect">
+              <a:avLst/>
+            </a:prstGeom>
+            <a:noFill/>
+          </p:spPr>
+          <p:txBody>
+            <a:bodyPr wrap="none" rtlCol="0">
+              <a:spAutoFit/>
+            </a:bodyPr>
+            <a:lstStyle/>
+            <a:p>
+              <a:r>
+                <a:rPr lang="en-GB" sz="3600" dirty="0">
+                  <a:solidFill>
+                    <a:schemeClr val="accent3">
+                      <a:lumMod val="20000"/>
+                      <a:lumOff val="80000"/>
+                    </a:schemeClr>
+                  </a:solidFill>
+                </a:rPr>
+                <a:t>R</a:t>
+              </a:r>
+              <a:endParaRPr lang="en-GB" sz="3600" baseline="-25000" dirty="0">
+                <a:solidFill>
+                  <a:schemeClr val="accent3">
+                    <a:lumMod val="20000"/>
+                    <a:lumOff val="80000"/>
+                  </a:schemeClr>
+                </a:solidFill>
+              </a:endParaRPr>
+            </a:p>
+          </p:txBody>
+        </p:sp>
+        <p:sp>
+          <p:nvSpPr>
+            <p:cNvPr id="10" name="TextBox 9">
+              <a:extLst>
+                <a:ext uri="{FF2B5EF4-FFF2-40B4-BE49-F238E27FC236}">
+                  <a16:creationId xmlns:a16="http://schemas.microsoft.com/office/drawing/2014/main" id="{DA43F5FC-1BF3-4438-BF09-4A712BB936CA}"/>
+                </a:ext>
+              </a:extLst>
+            </p:cNvPr>
+            <p:cNvSpPr txBox="1"/>
+            <p:nvPr/>
+          </p:nvSpPr>
+          <p:spPr>
+            <a:xfrm>
+              <a:off x="7186192" y="135929"/>
+              <a:ext cx="476412" cy="646331"/>
+            </a:xfrm>
+            <a:prstGeom prst="rect">
+              <a:avLst/>
+            </a:prstGeom>
+            <a:noFill/>
+          </p:spPr>
+          <p:txBody>
+            <a:bodyPr wrap="none" rtlCol="0">
+              <a:spAutoFit/>
+            </a:bodyPr>
+            <a:lstStyle/>
+            <a:p>
+              <a:r>
+                <a:rPr lang="en-GB" sz="3600" dirty="0">
+                  <a:solidFill>
+                    <a:schemeClr val="accent3">
+                      <a:lumMod val="20000"/>
+                      <a:lumOff val="80000"/>
+                    </a:schemeClr>
+                  </a:solidFill>
+                </a:rPr>
+                <a:t>G</a:t>
+              </a:r>
+              <a:endParaRPr lang="en-GB" sz="3600" baseline="-25000" dirty="0">
+                <a:solidFill>
+                  <a:schemeClr val="accent3">
+                    <a:lumMod val="20000"/>
+                    <a:lumOff val="80000"/>
+                  </a:schemeClr>
+                </a:solidFill>
+              </a:endParaRPr>
+            </a:p>
+          </p:txBody>
+        </p:sp>
+        <p:sp>
+          <p:nvSpPr>
+            <p:cNvPr id="11" name="TextBox 10">
+              <a:extLst>
+                <a:ext uri="{FF2B5EF4-FFF2-40B4-BE49-F238E27FC236}">
+                  <a16:creationId xmlns:a16="http://schemas.microsoft.com/office/drawing/2014/main" id="{2B4FFB84-BF75-48C6-A678-0DDE22523F4E}"/>
+                </a:ext>
+              </a:extLst>
+            </p:cNvPr>
+            <p:cNvSpPr txBox="1"/>
+            <p:nvPr/>
+          </p:nvSpPr>
+          <p:spPr>
+            <a:xfrm>
+              <a:off x="8706237" y="162354"/>
+              <a:ext cx="394900" cy="646331"/>
+            </a:xfrm>
+            <a:prstGeom prst="rect">
+              <a:avLst/>
+            </a:prstGeom>
+            <a:noFill/>
+          </p:spPr>
+          <p:txBody>
+            <a:bodyPr wrap="square" rtlCol="0">
+              <a:spAutoFit/>
+            </a:bodyPr>
+            <a:lstStyle/>
+            <a:p>
+              <a:r>
+                <a:rPr lang="en-GB" sz="3600" dirty="0">
+                  <a:solidFill>
+                    <a:schemeClr val="accent3">
+                      <a:lumMod val="20000"/>
+                      <a:lumOff val="80000"/>
+                    </a:schemeClr>
+                  </a:solidFill>
+                </a:rPr>
+                <a:t>B</a:t>
+              </a:r>
+              <a:endParaRPr lang="en-GB" sz="3600" baseline="-25000" dirty="0">
+                <a:solidFill>
+                  <a:schemeClr val="accent3">
+                    <a:lumMod val="20000"/>
+                    <a:lumOff val="80000"/>
+                  </a:schemeClr>
+                </a:solidFill>
+              </a:endParaRPr>
+            </a:p>
+          </p:txBody>
+        </p:sp>
+        <p:sp>
+          <p:nvSpPr>
+            <p:cNvPr id="12" name="TextBox 11">
+              <a:extLst>
+                <a:ext uri="{FF2B5EF4-FFF2-40B4-BE49-F238E27FC236}">
+                  <a16:creationId xmlns:a16="http://schemas.microsoft.com/office/drawing/2014/main" id="{8F1FC395-128F-411C-82F0-9FB5A8061FD1}"/>
+                </a:ext>
+              </a:extLst>
+            </p:cNvPr>
+            <p:cNvSpPr txBox="1"/>
+            <p:nvPr/>
+          </p:nvSpPr>
+          <p:spPr>
+            <a:xfrm>
+              <a:off x="10156848" y="135929"/>
+              <a:ext cx="452368" cy="646331"/>
+            </a:xfrm>
+            <a:prstGeom prst="rect">
+              <a:avLst/>
+            </a:prstGeom>
+            <a:noFill/>
+          </p:spPr>
+          <p:txBody>
+            <a:bodyPr wrap="none" rtlCol="0">
+              <a:spAutoFit/>
+            </a:bodyPr>
+            <a:lstStyle/>
+            <a:p>
+              <a:r>
+                <a:rPr lang="en-GB" sz="3600" dirty="0">
+                  <a:solidFill>
+                    <a:schemeClr val="accent3">
+                      <a:lumMod val="20000"/>
+                      <a:lumOff val="80000"/>
+                    </a:schemeClr>
+                  </a:solidFill>
+                </a:rPr>
+                <a:t>A</a:t>
+              </a:r>
+              <a:endParaRPr lang="en-GB" sz="3600" baseline="-25000" dirty="0">
+                <a:solidFill>
+                  <a:schemeClr val="accent3">
+                    <a:lumMod val="20000"/>
+                    <a:lumOff val="80000"/>
+                  </a:schemeClr>
+                </a:solidFill>
+              </a:endParaRPr>
+            </a:p>
+          </p:txBody>
+        </p:sp>
+      </p:grpSp>
+      <p:sp>
+        <p:nvSpPr>
+          <p:cNvPr id="20" name="TextBox 19">
+            <a:extLst>
+              <a:ext uri="{FF2B5EF4-FFF2-40B4-BE49-F238E27FC236}">
+                <a16:creationId xmlns:a16="http://schemas.microsoft.com/office/drawing/2014/main" id="{A19F72CE-E52E-4D32-94BA-0E5220BD2997}"/>
+              </a:ext>
+            </a:extLst>
+          </p:cNvPr>
+          <p:cNvSpPr txBox="1"/>
+          <p:nvPr/>
+        </p:nvSpPr>
+        <p:spPr>
+          <a:xfrm>
+            <a:off x="5430996" y="-22313"/>
+            <a:ext cx="6886950" cy="923330"/>
+          </a:xfrm>
+          <a:prstGeom prst="rect">
+            <a:avLst/>
+          </a:prstGeom>
+          <a:noFill/>
+          <a:ln>
+            <a:solidFill>
+              <a:schemeClr val="bg1"/>
+            </a:solidFill>
+          </a:ln>
+        </p:spPr>
+        <p:txBody>
+          <a:bodyPr wrap="none" rtlCol="0">
+            <a:spAutoFit/>
+          </a:bodyPr>
+          <a:lstStyle/>
+          <a:p>
+            <a:r>
+              <a:rPr lang="en-GB" sz="5400" dirty="0"/>
+              <a:t>Offset = 3 * </a:t>
+            </a:r>
+            <a:r>
+              <a:rPr lang="en-GB" sz="5400" dirty="0" err="1"/>
+              <a:t>sizeof</a:t>
+            </a:r>
+            <a:r>
+              <a:rPr lang="en-GB" sz="5400" dirty="0"/>
+              <a:t>(float)</a:t>
+            </a:r>
+          </a:p>
+        </p:txBody>
+      </p:sp>
+      <p:sp>
+        <p:nvSpPr>
+          <p:cNvPr id="21" name="Arrow: Right 20">
+            <a:extLst>
+              <a:ext uri="{FF2B5EF4-FFF2-40B4-BE49-F238E27FC236}">
+                <a16:creationId xmlns:a16="http://schemas.microsoft.com/office/drawing/2014/main" id="{5FA06DC4-30B3-44BC-BDD4-939E8CCFA85A}"/>
+              </a:ext>
+            </a:extLst>
+          </p:cNvPr>
+          <p:cNvSpPr/>
+          <p:nvPr/>
+        </p:nvSpPr>
+        <p:spPr>
+          <a:xfrm>
+            <a:off x="933664" y="274428"/>
+            <a:ext cx="4338424" cy="534257"/>
+          </a:xfrm>
+          <a:prstGeom prst="rightArrow">
+            <a:avLst/>
+          </a:prstGeom>
+        </p:spPr>
+        <p:style>
+          <a:lnRef idx="2">
+            <a:schemeClr val="accent1">
+              <a:shade val="50000"/>
+            </a:schemeClr>
+          </a:lnRef>
+          <a:fillRef idx="1">
+            <a:schemeClr val="accent1"/>
+          </a:fillRef>
+          <a:effectRef idx="0">
+            <a:schemeClr val="accent1"/>
+          </a:effectRef>
+          <a:fontRef idx="minor">
+            <a:schemeClr val="lt1"/>
+          </a:fontRef>
+        </p:style>
+        <p:txBody>
+          <a:bodyPr rtlCol="0" anchor="ctr"/>
+          <a:lstStyle/>
+          <a:p>
+            <a:pPr algn="ctr"/>
+            <a:endParaRPr lang="en-GB"/>
+          </a:p>
+        </p:txBody>
+      </p:sp>
+    </p:spTree>
+    <p:extLst>
+      <p:ext uri="{BB962C8B-B14F-4D97-AF65-F5344CB8AC3E}">
+        <p14:creationId xmlns:p14="http://schemas.microsoft.com/office/powerpoint/2010/main" val="2960453755"/>
       </p:ext>
     </p:extLst>
   </p:cSld>

</xml_diff>